<commit_message>
Poster fertig, Plot aktualisiert, Evidence Ratio
</commit_message>
<xml_diff>
--- a/Posters/Poster GEBF & School of Education/Poster School of Education.pptx
+++ b/Posters/Poster GEBF & School of Education/Poster School of Education.pptx
@@ -3860,10 +3860,10 @@
         </p:grpSpPr>
         <p:grpSp>
           <p:nvGrpSpPr>
-            <p:cNvPr id="22" name="Gruppieren 21">
+            <p:cNvPr id="37" name="Gruppieren 36">
               <a:extLst>
                 <a:ext uri="{FF2B5EF4-FFF2-40B4-BE49-F238E27FC236}">
-                  <a16:creationId xmlns:a16="http://schemas.microsoft.com/office/drawing/2014/main" id="{617402AE-3643-7568-1647-410DD81E5FAD}"/>
+                  <a16:creationId xmlns:a16="http://schemas.microsoft.com/office/drawing/2014/main" id="{A508BC66-CDD9-30A0-2D49-A16D2DC1CC17}"/>
                 </a:ext>
               </a:extLst>
             </p:cNvPr>
@@ -3874,172 +3874,112 @@
             <a:xfrm>
               <a:off x="19869732" y="39282328"/>
               <a:ext cx="9223518" cy="3308146"/>
-              <a:chOff x="19822378" y="37855230"/>
-              <a:chExt cx="9223518" cy="3308146"/>
+              <a:chOff x="17175550" y="37854018"/>
+              <a:chExt cx="11736311" cy="2961103"/>
             </a:xfrm>
           </p:grpSpPr>
-          <p:grpSp>
-            <p:nvGrpSpPr>
-              <p:cNvPr id="37" name="Gruppieren 36">
+          <p:sp>
+            <p:nvSpPr>
+              <p:cNvPr id="35" name="Abgerundetes Rechteck 34">
                 <a:extLst>
                   <a:ext uri="{FF2B5EF4-FFF2-40B4-BE49-F238E27FC236}">
-                    <a16:creationId xmlns:a16="http://schemas.microsoft.com/office/drawing/2014/main" id="{A508BC66-CDD9-30A0-2D49-A16D2DC1CC17}"/>
+                    <a16:creationId xmlns:a16="http://schemas.microsoft.com/office/drawing/2014/main" id="{6B672127-FBFF-78B2-0FB9-83528105EE76}"/>
                   </a:ext>
                 </a:extLst>
               </p:cNvPr>
-              <p:cNvGrpSpPr/>
+              <p:cNvSpPr/>
               <p:nvPr/>
-            </p:nvGrpSpPr>
-            <p:grpSpPr>
+            </p:nvSpPr>
+            <p:spPr>
               <a:xfrm>
-                <a:off x="19822378" y="37855230"/>
-                <a:ext cx="9223518" cy="3308146"/>
-                <a:chOff x="17175550" y="37854018"/>
-                <a:chExt cx="11736311" cy="2961103"/>
+                <a:off x="17175550" y="37854018"/>
+                <a:ext cx="11736311" cy="2961103"/>
               </a:xfrm>
-            </p:grpSpPr>
-            <p:sp>
-              <p:nvSpPr>
-                <p:cNvPr id="35" name="Abgerundetes Rechteck 34">
-                  <a:extLst>
-                    <a:ext uri="{FF2B5EF4-FFF2-40B4-BE49-F238E27FC236}">
-                      <a16:creationId xmlns:a16="http://schemas.microsoft.com/office/drawing/2014/main" id="{6B672127-FBFF-78B2-0FB9-83528105EE76}"/>
-                    </a:ext>
-                  </a:extLst>
-                </p:cNvPr>
-                <p:cNvSpPr/>
-                <p:nvPr/>
-              </p:nvSpPr>
-              <p:spPr>
-                <a:xfrm>
-                  <a:off x="17175550" y="37854018"/>
-                  <a:ext cx="11736311" cy="2961103"/>
-                </a:xfrm>
-                <a:prstGeom prst="roundRect">
-                  <a:avLst>
-                    <a:gd name="adj" fmla="val 28551"/>
-                  </a:avLst>
-                </a:prstGeom>
+              <a:prstGeom prst="roundRect">
+                <a:avLst>
+                  <a:gd name="adj" fmla="val 20259"/>
+                </a:avLst>
+              </a:prstGeom>
+              <a:solidFill>
+                <a:schemeClr val="bg1">
+                  <a:lumMod val="85000"/>
+                </a:schemeClr>
+              </a:solidFill>
+              <a:ln w="9525">
                 <a:solidFill>
-                  <a:schemeClr val="bg1">
-                    <a:lumMod val="85000"/>
-                  </a:schemeClr>
+                  <a:schemeClr val="tx1"/>
                 </a:solidFill>
-                <a:ln>
+              </a:ln>
+            </p:spPr>
+            <p:style>
+              <a:lnRef idx="2">
+                <a:schemeClr val="accent1">
+                  <a:shade val="15000"/>
+                </a:schemeClr>
+              </a:lnRef>
+              <a:fillRef idx="1">
+                <a:schemeClr val="accent1"/>
+              </a:fillRef>
+              <a:effectRef idx="0">
+                <a:schemeClr val="accent1"/>
+              </a:effectRef>
+              <a:fontRef idx="minor">
+                <a:schemeClr val="lt1"/>
+              </a:fontRef>
+            </p:style>
+            <p:txBody>
+              <a:bodyPr rtlCol="0" anchor="ctr"/>
+              <a:lstStyle/>
+              <a:p>
+                <a:pPr algn="ctr"/>
+                <a:endParaRPr lang="de-DE" sz="3200" dirty="0">
                   <a:solidFill>
                     <a:schemeClr val="tx1"/>
                   </a:solidFill>
-                </a:ln>
-              </p:spPr>
-              <p:style>
-                <a:lnRef idx="2">
-                  <a:schemeClr val="accent1">
-                    <a:shade val="15000"/>
-                  </a:schemeClr>
-                </a:lnRef>
-                <a:fillRef idx="1">
-                  <a:schemeClr val="accent1"/>
-                </a:fillRef>
-                <a:effectRef idx="0">
-                  <a:schemeClr val="accent1"/>
-                </a:effectRef>
-                <a:fontRef idx="minor">
-                  <a:schemeClr val="lt1"/>
-                </a:fontRef>
-              </p:style>
-              <p:txBody>
-                <a:bodyPr rtlCol="0" anchor="ctr"/>
-                <a:lstStyle/>
-                <a:p>
-                  <a:pPr algn="ctr"/>
-                  <a:endParaRPr lang="de-DE" sz="3200" dirty="0">
+                </a:endParaRPr>
+              </a:p>
+            </p:txBody>
+          </p:sp>
+          <p:sp>
+            <p:nvSpPr>
+              <p:cNvPr id="36" name="Textfeld 35">
+                <a:extLst>
+                  <a:ext uri="{FF2B5EF4-FFF2-40B4-BE49-F238E27FC236}">
+                    <a16:creationId xmlns:a16="http://schemas.microsoft.com/office/drawing/2014/main" id="{0D5E7A16-BB5D-BF1E-A4A0-239225F5A680}"/>
+                  </a:ext>
+                </a:extLst>
+              </p:cNvPr>
+              <p:cNvSpPr txBox="1"/>
+              <p:nvPr/>
+            </p:nvSpPr>
+            <p:spPr>
+              <a:xfrm>
+                <a:off x="21664790" y="38086248"/>
+                <a:ext cx="6983859" cy="1322348"/>
+              </a:xfrm>
+              <a:prstGeom prst="rect">
+                <a:avLst/>
+              </a:prstGeom>
+              <a:noFill/>
+            </p:spPr>
+            <p:txBody>
+              <a:bodyPr wrap="square" rtlCol="0">
+                <a:spAutoFit/>
+              </a:bodyPr>
+              <a:lstStyle/>
+              <a:p>
+                <a:pPr algn="just"/>
+                <a:r>
+                  <a:rPr lang="de-DE" sz="3000" dirty="0">
                     <a:solidFill>
                       <a:schemeClr val="tx1"/>
                     </a:solidFill>
-                  </a:endParaRPr>
-                </a:p>
-              </p:txBody>
-            </p:sp>
-            <p:sp>
-              <p:nvSpPr>
-                <p:cNvPr id="36" name="Textfeld 35">
-                  <a:extLst>
-                    <a:ext uri="{FF2B5EF4-FFF2-40B4-BE49-F238E27FC236}">
-                      <a16:creationId xmlns:a16="http://schemas.microsoft.com/office/drawing/2014/main" id="{0D5E7A16-BB5D-BF1E-A4A0-239225F5A680}"/>
-                    </a:ext>
-                  </a:extLst>
-                </p:cNvPr>
-                <p:cNvSpPr txBox="1"/>
-                <p:nvPr/>
-              </p:nvSpPr>
-              <p:spPr>
-                <a:xfrm>
-                  <a:off x="21212089" y="38086248"/>
-                  <a:ext cx="7436561" cy="909114"/>
-                </a:xfrm>
-                <a:prstGeom prst="rect">
-                  <a:avLst/>
-                </a:prstGeom>
-                <a:noFill/>
-              </p:spPr>
-              <p:txBody>
-                <a:bodyPr wrap="square" rtlCol="0">
-                  <a:spAutoFit/>
-                </a:bodyPr>
-                <a:lstStyle/>
-                <a:p>
-                  <a:pPr algn="just"/>
-                  <a:r>
-                    <a:rPr lang="de-DE" sz="3000" dirty="0">
-                      <a:solidFill>
-                        <a:schemeClr val="tx1"/>
-                      </a:solidFill>
-                    </a:rPr>
-                    <a:t>Bitte folgen Sie dem Link über den QR-Code oder sprechen Sie mich an! </a:t>
-                  </a:r>
-                </a:p>
-              </p:txBody>
-            </p:sp>
-          </p:grpSp>
-          <p:pic>
-            <p:nvPicPr>
-              <p:cNvPr id="18" name="Grafik 17" descr="Ein Bild, das Muster, Pixel enthält.&#10;&#10;Automatisch generierte Beschreibung">
-                <a:extLst>
-                  <a:ext uri="{FF2B5EF4-FFF2-40B4-BE49-F238E27FC236}">
-                    <a16:creationId xmlns:a16="http://schemas.microsoft.com/office/drawing/2014/main" id="{F1AAE305-3B6B-75D8-8CF3-B022E9B6BCE7}"/>
-                  </a:ext>
-                </a:extLst>
-              </p:cNvPr>
-              <p:cNvPicPr>
-                <a:picLocks noChangeAspect="1"/>
-              </p:cNvPicPr>
-              <p:nvPr/>
-            </p:nvPicPr>
-            <p:blipFill rotWithShape="1">
-              <a:blip r:embed="rId3"/>
-              <a:srcRect l="4" t="-5" r="-4" b="5"/>
-              <a:stretch/>
-            </p:blipFill>
-            <p:spPr bwMode="auto">
-              <a:xfrm>
-                <a:off x="20140366" y="38053811"/>
-                <a:ext cx="2892099" cy="2910983"/>
-              </a:xfrm>
-              <a:prstGeom prst="roundRect">
-                <a:avLst/>
-              </a:prstGeom>
-              <a:ln w="28575">
-                <a:solidFill>
-                  <a:srgbClr val="73AC00"/>
-                </a:solidFill>
-              </a:ln>
-              <a:extLst>
-                <a:ext uri="{53640926-AAD7-44D8-BBD7-CCE9431645EC}">
-                  <a14:shadowObscured xmlns:a14="http://schemas.microsoft.com/office/drawing/2010/main"/>
-                </a:ext>
-              </a:extLst>
-            </p:spPr>
-          </p:pic>
+                  </a:rPr>
+                  <a:t>Bitte folgen Sie dem Link über den QR-Code oder sprechen Sie mich an! </a:t>
+                </a:r>
+              </a:p>
+            </p:txBody>
+          </p:sp>
         </p:grpSp>
         <p:pic>
           <p:nvPicPr>
@@ -4056,7 +3996,7 @@
             <p:nvPr/>
           </p:nvPicPr>
           <p:blipFill>
-            <a:blip r:embed="rId4">
+            <a:blip r:embed="rId3">
               <a:clrChange>
                 <a:clrFrom>
                   <a:srgbClr val="FFFFFF"/>
@@ -4302,7 +4242,7 @@
                 </a:solidFill>
                 <a:latin typeface="+mj-lt"/>
               </a:rPr>
-              <a:t>Wie komplex rezipieren Lehrkräfte Lernstandsergebnisse und wie hängt dies mit ihrer </a:t>
+              <a:t>Wie komplex rezipieren Lehrkräfte Lernstandsergebnisse und wie hängt dies mit ihrer Graph </a:t>
             </a:r>
             <a:r>
               <a:rPr lang="de-DE" sz="8800" b="1" u="sng" dirty="0" err="1">
@@ -4311,25 +4251,7 @@
                 </a:solidFill>
                 <a:latin typeface="+mj-lt"/>
               </a:rPr>
-              <a:t>graph</a:t>
-            </a:r>
-            <a:r>
-              <a:rPr lang="de-DE" sz="8800" b="1" u="sng" dirty="0">
-                <a:solidFill>
-                  <a:schemeClr val="tx1"/>
-                </a:solidFill>
-                <a:latin typeface="+mj-lt"/>
-              </a:rPr>
-              <a:t> </a:t>
-            </a:r>
-            <a:r>
-              <a:rPr lang="de-DE" sz="8800" b="1" u="sng" dirty="0" err="1">
-                <a:solidFill>
-                  <a:schemeClr val="tx1"/>
-                </a:solidFill>
-                <a:latin typeface="+mj-lt"/>
-              </a:rPr>
-              <a:t>literacy</a:t>
+              <a:t>Literacy</a:t>
             </a:r>
             <a:r>
               <a:rPr lang="de-DE" sz="8800" b="1" u="sng" dirty="0">
@@ -4662,7 +4584,7 @@
         <p:spPr>
           <a:xfrm>
             <a:off x="685800" y="6439394"/>
-            <a:ext cx="14232409" cy="8094524"/>
+            <a:ext cx="13766008" cy="8710077"/>
           </a:xfrm>
           <a:prstGeom prst="rect">
             <a:avLst/>
@@ -4681,7 +4603,21 @@
             </a:pPr>
             <a:r>
               <a:rPr lang="de-DE" sz="4000" dirty="0"/>
-              <a:t>Wenn Lehrkräfte ihre Entscheidungen auf Daten basieren, kann dies potenziell Schülerleistungen verbessern (Carlson et al., 2011; Faber et al., 2023). </a:t>
+              <a:t>Wenn Lehrkräfte ihre Entscheidungen auf Daten basieren, kann dies potenziell Schülerleistungen verbessern </a:t>
+            </a:r>
+            <a:r>
+              <a:rPr lang="de-DE" sz="4000" i="1" dirty="0">
+                <a:solidFill>
+                  <a:schemeClr val="bg1">
+                    <a:lumMod val="50000"/>
+                  </a:schemeClr>
+                </a:solidFill>
+              </a:rPr>
+              <a:t>(Carlson et al., 2011; Faber et al., 2023; McNaughton et al., 2012)</a:t>
+            </a:r>
+            <a:r>
+              <a:rPr lang="de-DE" sz="4000" dirty="0"/>
+              <a:t>. </a:t>
             </a:r>
           </a:p>
           <a:p>
@@ -4691,25 +4627,97 @@
             </a:pPr>
             <a:r>
               <a:rPr lang="de-DE" sz="4000" dirty="0"/>
-              <a:t>Elementar für diese datenbasierten Entscheidungen (DBDM; Marsh 2012</a:t>
+              <a:t>Elementar für diese </a:t>
+            </a:r>
+            <a:r>
+              <a:rPr lang="de-DE" sz="4000" b="1" i="1" dirty="0">
+                <a:solidFill>
+                  <a:schemeClr val="accent3">
+                    <a:lumMod val="75000"/>
+                  </a:schemeClr>
+                </a:solidFill>
+              </a:rPr>
+              <a:t>datenbasierten Entscheidungen</a:t>
+            </a:r>
+            <a:r>
+              <a:rPr lang="de-DE" sz="4000" dirty="0">
+                <a:solidFill>
+                  <a:schemeClr val="accent3">
+                    <a:lumMod val="75000"/>
+                  </a:schemeClr>
+                </a:solidFill>
+              </a:rPr>
+              <a:t> </a:t>
+            </a:r>
+            <a:r>
+              <a:rPr lang="de-DE" sz="4000" dirty="0"/>
+              <a:t>(DBDM; </a:t>
+            </a:r>
+            <a:r>
+              <a:rPr lang="de-DE" sz="4000" i="1" dirty="0">
+                <a:solidFill>
+                  <a:schemeClr val="bg1">
+                    <a:lumMod val="50000"/>
+                  </a:schemeClr>
+                </a:solidFill>
+              </a:rPr>
+              <a:t>Marsh 2012</a:t>
             </a:r>
             <a:r>
               <a:rPr lang="de-DE" sz="4000" dirty="0">
                 <a:sym typeface="Wingdings" panose="05000000000000000000" pitchFamily="2" charset="2"/>
               </a:rPr>
-              <a:t>) ist die Fähigkeit, graphische Visualisierungen von Daten zu verstehen und in Informationen umzuwandeln, sowie ein hinreichendes statistisches Verständnis (</a:t>
-            </a:r>
-            <a:r>
-              <a:rPr lang="de-DE" sz="4000" dirty="0" err="1">
+              <a:t>) ist die Fähigkeit graphische Visualisierungen von Daten zu verstehen und in Informationen umzuwandeln, sowie ein hinreichendes statistisches Verständnis </a:t>
+            </a:r>
+            <a:r>
+              <a:rPr lang="de-DE" sz="4000" i="1" dirty="0">
+                <a:solidFill>
+                  <a:schemeClr val="bg1">
+                    <a:lumMod val="50000"/>
+                  </a:schemeClr>
+                </a:solidFill>
                 <a:sym typeface="Wingdings" panose="05000000000000000000" pitchFamily="2" charset="2"/>
               </a:rPr>
+              <a:t>(</a:t>
+            </a:r>
+            <a:r>
+              <a:rPr lang="de-DE" sz="4000" i="1" dirty="0" err="1">
+                <a:solidFill>
+                  <a:schemeClr val="bg1">
+                    <a:lumMod val="50000"/>
+                  </a:schemeClr>
+                </a:solidFill>
+                <a:sym typeface="Wingdings" panose="05000000000000000000" pitchFamily="2" charset="2"/>
+              </a:rPr>
               <a:t>Mandinach</a:t>
             </a:r>
             <a:r>
-              <a:rPr lang="de-DE" sz="4000" dirty="0">
+              <a:rPr lang="de-DE" sz="4000" i="1" dirty="0">
+                <a:solidFill>
+                  <a:schemeClr val="bg1">
+                    <a:lumMod val="50000"/>
+                  </a:schemeClr>
+                </a:solidFill>
                 <a:sym typeface="Wingdings" panose="05000000000000000000" pitchFamily="2" charset="2"/>
               </a:rPr>
-              <a:t> &amp; Gummer 2016). </a:t>
+              <a:t> &amp; Gummer 2016)</a:t>
+            </a:r>
+            <a:r>
+              <a:rPr lang="de-DE" sz="4000" i="1" dirty="0">
+                <a:sym typeface="Wingdings" panose="05000000000000000000" pitchFamily="2" charset="2"/>
+              </a:rPr>
+              <a:t>.</a:t>
+            </a:r>
+            <a:r>
+              <a:rPr lang="de-DE" sz="4000" i="1" dirty="0">
+                <a:solidFill>
+                  <a:schemeClr val="bg1">
+                    <a:lumMod val="50000"/>
+                  </a:schemeClr>
+                </a:solidFill>
+                <a:sym typeface="Wingdings" panose="05000000000000000000" pitchFamily="2" charset="2"/>
+              </a:rPr>
+              <a:t> </a:t>
             </a:r>
           </a:p>
           <a:p>
@@ -4724,10 +4732,82 @@
               <a:t>Oft ist diese </a:t>
             </a:r>
             <a:r>
+              <a:rPr lang="de-DE" sz="4000" b="1" i="1" dirty="0">
+                <a:solidFill>
+                  <a:schemeClr val="accent3">
+                    <a:lumMod val="75000"/>
+                  </a:schemeClr>
+                </a:solidFill>
+                <a:sym typeface="Wingdings" panose="05000000000000000000" pitchFamily="2" charset="2"/>
+              </a:rPr>
+              <a:t>Graph </a:t>
+            </a:r>
+            <a:r>
+              <a:rPr lang="de-DE" sz="4000" b="1" i="1" dirty="0" err="1">
+                <a:solidFill>
+                  <a:schemeClr val="accent3">
+                    <a:lumMod val="75000"/>
+                  </a:schemeClr>
+                </a:solidFill>
+                <a:sym typeface="Wingdings" panose="05000000000000000000" pitchFamily="2" charset="2"/>
+              </a:rPr>
+              <a:t>Literacy</a:t>
+            </a:r>
+            <a:r>
+              <a:rPr lang="de-DE" sz="4000" b="1" i="1" dirty="0">
+                <a:solidFill>
+                  <a:schemeClr val="accent3">
+                    <a:lumMod val="75000"/>
+                  </a:schemeClr>
+                </a:solidFill>
+                <a:sym typeface="Wingdings" panose="05000000000000000000" pitchFamily="2" charset="2"/>
+              </a:rPr>
+              <a:t> </a:t>
+            </a:r>
+            <a:r>
+              <a:rPr lang="de-DE" sz="4000" i="1" dirty="0">
+                <a:solidFill>
+                  <a:schemeClr val="bg1">
+                    <a:lumMod val="50000"/>
+                  </a:schemeClr>
+                </a:solidFill>
+                <a:sym typeface="Wingdings" panose="05000000000000000000" pitchFamily="2" charset="2"/>
+              </a:rPr>
+              <a:t>(</a:t>
+            </a:r>
+            <a:r>
+              <a:rPr lang="de-DE" sz="4000" i="1" dirty="0" err="1">
+                <a:solidFill>
+                  <a:schemeClr val="bg1">
+                    <a:lumMod val="50000"/>
+                  </a:schemeClr>
+                </a:solidFill>
+                <a:sym typeface="Wingdings" panose="05000000000000000000" pitchFamily="2" charset="2"/>
+              </a:rPr>
+              <a:t>Friel</a:t>
+            </a:r>
+            <a:r>
+              <a:rPr lang="de-DE" sz="4000" i="1" dirty="0">
+                <a:solidFill>
+                  <a:schemeClr val="bg1">
+                    <a:lumMod val="50000"/>
+                  </a:schemeClr>
+                </a:solidFill>
+                <a:sym typeface="Wingdings" panose="05000000000000000000" pitchFamily="2" charset="2"/>
+              </a:rPr>
+              <a:t> et al., 2001) </a:t>
+            </a:r>
+            <a:r>
+              <a:rPr lang="de-DE" sz="4000" dirty="0">
+                <a:sym typeface="Wingdings" panose="05000000000000000000" pitchFamily="2" charset="2"/>
+              </a:rPr>
+              <a:t>in drei hierarchische Level gegliedert: Reading </a:t>
+            </a:r>
+            <a:r>
               <a:rPr lang="de-DE" sz="4000" dirty="0" err="1">
                 <a:sym typeface="Wingdings" panose="05000000000000000000" pitchFamily="2" charset="2"/>
               </a:rPr>
-              <a:t>graph</a:t>
+              <a:t>the</a:t>
             </a:r>
             <a:r>
               <a:rPr lang="de-DE" sz="4000" dirty="0">
@@ -4739,25 +4819,25 @@
               <a:rPr lang="de-DE" sz="4000" dirty="0" err="1">
                 <a:sym typeface="Wingdings" panose="05000000000000000000" pitchFamily="2" charset="2"/>
               </a:rPr>
-              <a:t>literacy</a:t>
+              <a:t>data</a:t>
             </a:r>
             <a:r>
               <a:rPr lang="de-DE" sz="4000" dirty="0">
                 <a:sym typeface="Wingdings" panose="05000000000000000000" pitchFamily="2" charset="2"/>
               </a:rPr>
-              <a:t> (</a:t>
+              <a:t> (1), Reading </a:t>
             </a:r>
             <a:r>
               <a:rPr lang="de-DE" sz="4000" dirty="0" err="1">
                 <a:sym typeface="Wingdings" panose="05000000000000000000" pitchFamily="2" charset="2"/>
               </a:rPr>
-              <a:t>Friel</a:t>
+              <a:t>between</a:t>
             </a:r>
             <a:r>
               <a:rPr lang="de-DE" sz="4000" dirty="0">
                 <a:sym typeface="Wingdings" panose="05000000000000000000" pitchFamily="2" charset="2"/>
               </a:rPr>
-              <a:t> et al., 2001) in drei hierarchische Level gegliedert: Reading </a:t>
+              <a:t> </a:t>
             </a:r>
             <a:r>
               <a:rPr lang="de-DE" sz="4000" dirty="0" err="1">
@@ -4781,13 +4861,13 @@
               <a:rPr lang="de-DE" sz="4000" dirty="0">
                 <a:sym typeface="Wingdings" panose="05000000000000000000" pitchFamily="2" charset="2"/>
               </a:rPr>
-              <a:t> (1), </a:t>
+              <a:t> (2) und Reading </a:t>
             </a:r>
             <a:r>
               <a:rPr lang="de-DE" sz="4000" dirty="0" err="1">
                 <a:sym typeface="Wingdings" panose="05000000000000000000" pitchFamily="2" charset="2"/>
               </a:rPr>
-              <a:t>reading</a:t>
+              <a:t>beyond</a:t>
             </a:r>
             <a:r>
               <a:rPr lang="de-DE" sz="4000" dirty="0">
@@ -4799,7 +4879,7 @@
               <a:rPr lang="de-DE" sz="4000" dirty="0" err="1">
                 <a:sym typeface="Wingdings" panose="05000000000000000000" pitchFamily="2" charset="2"/>
               </a:rPr>
-              <a:t>between</a:t>
+              <a:t>the</a:t>
             </a:r>
             <a:r>
               <a:rPr lang="de-DE" sz="4000" dirty="0">
@@ -4811,73 +4891,13 @@
               <a:rPr lang="de-DE" sz="4000" dirty="0" err="1">
                 <a:sym typeface="Wingdings" panose="05000000000000000000" pitchFamily="2" charset="2"/>
               </a:rPr>
-              <a:t>the</a:t>
+              <a:t>data</a:t>
             </a:r>
             <a:r>
               <a:rPr lang="de-DE" sz="4000" dirty="0">
                 <a:sym typeface="Wingdings" panose="05000000000000000000" pitchFamily="2" charset="2"/>
               </a:rPr>
-              <a:t> </a:t>
-            </a:r>
-            <a:r>
-              <a:rPr lang="de-DE" sz="4000" dirty="0" err="1">
-                <a:sym typeface="Wingdings" panose="05000000000000000000" pitchFamily="2" charset="2"/>
-              </a:rPr>
-              <a:t>data</a:t>
-            </a:r>
-            <a:r>
-              <a:rPr lang="de-DE" sz="4000" dirty="0">
-                <a:sym typeface="Wingdings" panose="05000000000000000000" pitchFamily="2" charset="2"/>
-              </a:rPr>
-              <a:t> (2) und </a:t>
-            </a:r>
-            <a:r>
-              <a:rPr lang="de-DE" sz="4000" dirty="0" err="1">
-                <a:sym typeface="Wingdings" panose="05000000000000000000" pitchFamily="2" charset="2"/>
-              </a:rPr>
-              <a:t>reading</a:t>
-            </a:r>
-            <a:r>
-              <a:rPr lang="de-DE" sz="4000" dirty="0">
-                <a:sym typeface="Wingdings" panose="05000000000000000000" pitchFamily="2" charset="2"/>
-              </a:rPr>
-              <a:t> </a:t>
-            </a:r>
-            <a:r>
-              <a:rPr lang="de-DE" sz="4000" dirty="0" err="1">
-                <a:sym typeface="Wingdings" panose="05000000000000000000" pitchFamily="2" charset="2"/>
-              </a:rPr>
-              <a:t>beyond</a:t>
-            </a:r>
-            <a:r>
-              <a:rPr lang="de-DE" sz="4000" dirty="0">
-                <a:sym typeface="Wingdings" panose="05000000000000000000" pitchFamily="2" charset="2"/>
-              </a:rPr>
-              <a:t> </a:t>
-            </a:r>
-            <a:r>
-              <a:rPr lang="de-DE" sz="4000" dirty="0" err="1">
-                <a:sym typeface="Wingdings" panose="05000000000000000000" pitchFamily="2" charset="2"/>
-              </a:rPr>
-              <a:t>the</a:t>
-            </a:r>
-            <a:r>
-              <a:rPr lang="de-DE" sz="4000" dirty="0">
-                <a:sym typeface="Wingdings" panose="05000000000000000000" pitchFamily="2" charset="2"/>
-              </a:rPr>
-              <a:t> </a:t>
-            </a:r>
-            <a:r>
-              <a:rPr lang="de-DE" sz="4000" dirty="0" err="1">
-                <a:sym typeface="Wingdings" panose="05000000000000000000" pitchFamily="2" charset="2"/>
-              </a:rPr>
-              <a:t>data</a:t>
-            </a:r>
-            <a:r>
-              <a:rPr lang="de-DE" sz="4000" dirty="0">
-                <a:sym typeface="Wingdings" panose="05000000000000000000" pitchFamily="2" charset="2"/>
-              </a:rPr>
-              <a:t> (3)</a:t>
+              <a:t> (3).</a:t>
             </a:r>
           </a:p>
           <a:p>
@@ -4885,14 +4905,24 @@
               <a:buFont typeface="Arial" panose="020B0604020202020204" pitchFamily="34" charset="0"/>
               <a:buChar char="•"/>
             </a:pPr>
-            <a:endParaRPr lang="de-DE" sz="4000" dirty="0"/>
-          </a:p>
-          <a:p>
-            <a:pPr marL="457200" indent="-457200">
-              <a:buFont typeface="Arial" panose="020B0604020202020204" pitchFamily="34" charset="0"/>
-              <a:buChar char="•"/>
-            </a:pPr>
-            <a:endParaRPr lang="de-DE" sz="4000" dirty="0"/>
+            <a:r>
+              <a:rPr lang="de-DE" sz="4000" dirty="0"/>
+              <a:t>Lehrkräfte zeigen insbesondere Schwierigkeiten bei dem ersten und dritten Level, wobei das erste Level bei der Rezeption auch oft übersprungen wird </a:t>
+            </a:r>
+            <a:r>
+              <a:rPr lang="de-DE" sz="4000" i="1" dirty="0">
+                <a:solidFill>
+                  <a:schemeClr val="bg1">
+                    <a:lumMod val="50000"/>
+                  </a:schemeClr>
+                </a:solidFill>
+              </a:rPr>
+              <a:t>(Zeuch et al., 2017)</a:t>
+            </a:r>
+            <a:r>
+              <a:rPr lang="de-DE" sz="4000" dirty="0"/>
+              <a:t>.</a:t>
+            </a:r>
           </a:p>
         </p:txBody>
       </p:sp>
@@ -4910,8 +4940,8 @@
         </p:nvSpPr>
         <p:spPr>
           <a:xfrm>
-            <a:off x="15599819" y="6515449"/>
-            <a:ext cx="14033302" cy="9325630"/>
+            <a:off x="15137607" y="6515449"/>
+            <a:ext cx="14495514" cy="8217634"/>
           </a:xfrm>
           <a:prstGeom prst="rect">
             <a:avLst/>
@@ -4930,7 +4960,85 @@
             </a:pPr>
             <a:r>
               <a:rPr lang="de-DE" sz="4000" dirty="0"/>
-              <a:t>Lehrkräfte zeigen insbesondere Schwierigkeiten beim Lesen der Daten und dem Lesen jenseits der Daten, wobei das erste Level auch oft übersprungen wird (Zeuch et al., 2017) </a:t>
+              <a:t>Weiterhin konnten bisher keine Zusammenhänge zwischen der </a:t>
+            </a:r>
+            <a:r>
+              <a:rPr lang="de-DE" sz="4000" b="1" i="1" dirty="0">
+                <a:solidFill>
+                  <a:schemeClr val="accent3">
+                    <a:lumMod val="75000"/>
+                  </a:schemeClr>
+                </a:solidFill>
+              </a:rPr>
+              <a:t>Graph </a:t>
+            </a:r>
+            <a:r>
+              <a:rPr lang="de-DE" sz="4000" b="1" i="1" dirty="0" err="1">
+                <a:solidFill>
+                  <a:schemeClr val="accent3">
+                    <a:lumMod val="75000"/>
+                  </a:schemeClr>
+                </a:solidFill>
+              </a:rPr>
+              <a:t>Literacy</a:t>
+            </a:r>
+            <a:r>
+              <a:rPr lang="de-DE" sz="4000" b="1" i="1" dirty="0">
+                <a:solidFill>
+                  <a:schemeClr val="accent3">
+                    <a:lumMod val="75000"/>
+                  </a:schemeClr>
+                </a:solidFill>
+              </a:rPr>
+              <a:t> </a:t>
+            </a:r>
+            <a:r>
+              <a:rPr lang="de-DE" sz="4000" dirty="0"/>
+              <a:t>in einem Test und der </a:t>
+            </a:r>
+            <a:r>
+              <a:rPr lang="de-DE" sz="4000" b="1" i="1" dirty="0">
+                <a:solidFill>
+                  <a:schemeClr val="accent3">
+                    <a:lumMod val="75000"/>
+                  </a:schemeClr>
+                </a:solidFill>
+              </a:rPr>
+              <a:t>Graph Reading Performance</a:t>
+            </a:r>
+            <a:r>
+              <a:rPr lang="de-DE" sz="4000" dirty="0">
+                <a:solidFill>
+                  <a:srgbClr val="FF0000"/>
+                </a:solidFill>
+              </a:rPr>
+              <a:t> </a:t>
+            </a:r>
+            <a:r>
+              <a:rPr lang="de-DE" sz="4000" dirty="0"/>
+              <a:t>mit der Think-</a:t>
+            </a:r>
+            <a:r>
+              <a:rPr lang="de-DE" sz="4000" dirty="0" err="1"/>
+              <a:t>Aloud</a:t>
+            </a:r>
+            <a:r>
+              <a:rPr lang="de-DE" sz="4000" dirty="0"/>
+              <a:t> Methode festgestellt werden </a:t>
+            </a:r>
+            <a:r>
+              <a:rPr lang="de-DE" sz="4000" i="1" dirty="0">
+                <a:solidFill>
+                  <a:schemeClr val="bg1">
+                    <a:lumMod val="50000"/>
+                  </a:schemeClr>
+                </a:solidFill>
+              </a:rPr>
+              <a:t>(van den Bosch, 2017)</a:t>
+            </a:r>
+            <a:r>
+              <a:rPr lang="de-DE" sz="4000" dirty="0"/>
+              <a:t>.</a:t>
             </a:r>
           </a:p>
           <a:p>
@@ -4938,61 +5046,7 @@
               <a:buFont typeface="Arial" panose="020B0604020202020204" pitchFamily="34" charset="0"/>
               <a:buChar char="•"/>
             </a:pPr>
-            <a:r>
-              <a:rPr lang="de-DE" sz="4000" dirty="0"/>
-              <a:t>Weiterhin konnten bisher keine Zusammenhänge zwischen der </a:t>
-            </a:r>
-            <a:r>
-              <a:rPr lang="de-DE" sz="4000" dirty="0" err="1"/>
-              <a:t>graph</a:t>
-            </a:r>
-            <a:r>
-              <a:rPr lang="de-DE" sz="4000" dirty="0"/>
-              <a:t> </a:t>
-            </a:r>
-            <a:r>
-              <a:rPr lang="de-DE" sz="4000" dirty="0" err="1"/>
-              <a:t>literacy</a:t>
-            </a:r>
-            <a:r>
-              <a:rPr lang="de-DE" sz="4000" dirty="0"/>
-              <a:t> in einem Test und der </a:t>
-            </a:r>
-            <a:r>
-              <a:rPr lang="de-DE" sz="4000" dirty="0" err="1">
-                <a:solidFill>
-                  <a:srgbClr val="FF0000"/>
-                </a:solidFill>
-              </a:rPr>
-              <a:t>Graphlese</a:t>
-            </a:r>
-            <a:r>
-              <a:rPr lang="de-DE" sz="4000" dirty="0">
-                <a:solidFill>
-                  <a:srgbClr val="FF0000"/>
-                </a:solidFill>
-              </a:rPr>
-              <a:t>-Performanz</a:t>
-            </a:r>
-            <a:r>
-              <a:rPr lang="de-DE" sz="4000" dirty="0"/>
-              <a:t> während Think-</a:t>
-            </a:r>
-            <a:r>
-              <a:rPr lang="de-DE" sz="4000" dirty="0" err="1"/>
-              <a:t>Alouds</a:t>
-            </a:r>
-            <a:r>
-              <a:rPr lang="de-DE" sz="4000" dirty="0"/>
-              <a:t> festgestellt werden (van den Bosch, 2017)</a:t>
-            </a:r>
-          </a:p>
-          <a:p>
-            <a:pPr marL="571500" indent="-571500" algn="just">
-              <a:buFont typeface="Arial" panose="020B0604020202020204" pitchFamily="34" charset="0"/>
-              <a:buChar char="•"/>
-            </a:pPr>
-            <a:endParaRPr lang="de-DE" sz="2800" dirty="0"/>
+            <a:endParaRPr lang="de-DE" sz="4800" dirty="0"/>
           </a:p>
           <a:p>
             <a:pPr algn="just"/>
@@ -5002,7 +5056,7 @@
             </a:r>
             <a:r>
               <a:rPr lang="de-DE" sz="4000" dirty="0"/>
-              <a:t>Wie häufig adressieren Lehrkräfte unterschiedliche komplexe statistische Entitäten durchschnittlich?</a:t>
+              <a:t>Wie häufig adressieren Lehrkräfte unterschiedlich komplexe statistische Entitäten durchschnittlich?</a:t>
             </a:r>
           </a:p>
           <a:p>
@@ -5013,23 +5067,55 @@
             </a:r>
             <a:r>
               <a:rPr lang="de-DE" sz="4000" dirty="0"/>
-              <a:t>Inwieweit prädiziert die allgemeine </a:t>
-            </a:r>
-            <a:r>
-              <a:rPr lang="de-DE" sz="4000" dirty="0" err="1"/>
-              <a:t>graph</a:t>
+              <a:t>Inwieweit prädiziert deren allgemeine </a:t>
+            </a:r>
+            <a:r>
+              <a:rPr lang="de-DE" sz="4000" b="1" i="1" dirty="0">
+                <a:solidFill>
+                  <a:schemeClr val="accent3">
+                    <a:lumMod val="75000"/>
+                  </a:schemeClr>
+                </a:solidFill>
+              </a:rPr>
+              <a:t>Graph </a:t>
+            </a:r>
+            <a:r>
+              <a:rPr lang="de-DE" sz="4000" b="1" i="1" dirty="0" err="1">
+                <a:solidFill>
+                  <a:schemeClr val="accent3">
+                    <a:lumMod val="75000"/>
+                  </a:schemeClr>
+                </a:solidFill>
+              </a:rPr>
+              <a:t>Literacy</a:t>
+            </a:r>
+            <a:r>
+              <a:rPr lang="de-DE" sz="4000" b="1" i="1" dirty="0">
+                <a:solidFill>
+                  <a:schemeClr val="accent3">
+                    <a:lumMod val="75000"/>
+                  </a:schemeClr>
+                </a:solidFill>
+              </a:rPr>
+              <a:t> </a:t>
             </a:r>
             <a:r>
               <a:rPr lang="de-DE" sz="4000" dirty="0"/>
+              <a:t>(gemessen durch einen Test)</a:t>
+            </a:r>
+            <a:r>
+              <a:rPr lang="de-DE" sz="4000" b="1" i="1" dirty="0">
+                <a:solidFill>
+                  <a:schemeClr val="accent3">
+                    <a:lumMod val="75000"/>
+                  </a:schemeClr>
+                </a:solidFill>
+              </a:rPr>
               <a:t> </a:t>
             </a:r>
             <a:r>
-              <a:rPr lang="de-DE" sz="4000" dirty="0" err="1"/>
-              <a:t>literacy</a:t>
-            </a:r>
-            <a:r>
               <a:rPr lang="de-DE" sz="4000" dirty="0"/>
-              <a:t> diese Häufigkeiten?</a:t>
+              <a:t>diese Häufigkeiten?</a:t>
             </a:r>
           </a:p>
           <a:p>
@@ -5040,44 +5126,64 @@
             </a:r>
             <a:r>
               <a:rPr lang="de-DE" sz="4000" dirty="0"/>
-              <a:t>Inwieweit prädiziert die allgemeine </a:t>
+              <a:t>Inwieweit prädiziert deren allgemeine </a:t>
+            </a:r>
+            <a:r>
+              <a:rPr lang="de-DE" sz="4000" b="1" i="1" dirty="0">
+                <a:solidFill>
+                  <a:schemeClr val="accent3">
+                    <a:lumMod val="75000"/>
+                  </a:schemeClr>
+                </a:solidFill>
+              </a:rPr>
+              <a:t>Graph </a:t>
+            </a:r>
+            <a:r>
+              <a:rPr lang="de-DE" sz="4000" b="1" i="1" dirty="0" err="1">
+                <a:solidFill>
+                  <a:schemeClr val="accent3">
+                    <a:lumMod val="75000"/>
+                  </a:schemeClr>
+                </a:solidFill>
+              </a:rPr>
+              <a:t>Literacy</a:t>
+            </a:r>
+            <a:r>
+              <a:rPr lang="de-DE" sz="4000" b="1" i="1" dirty="0">
+                <a:solidFill>
+                  <a:schemeClr val="accent3">
+                    <a:lumMod val="75000"/>
+                  </a:schemeClr>
+                </a:solidFill>
+              </a:rPr>
+              <a:t> </a:t>
+            </a:r>
+            <a:r>
+              <a:rPr lang="de-DE" sz="4000" dirty="0"/>
+              <a:t>(gemessen durch einen Test) deren </a:t>
+            </a:r>
+            <a:r>
+              <a:rPr lang="de-DE" sz="4000" b="1" i="1" dirty="0">
+                <a:solidFill>
+                  <a:schemeClr val="accent3">
+                    <a:lumMod val="75000"/>
+                  </a:schemeClr>
+                </a:solidFill>
+              </a:rPr>
+              <a:t>Graph Reading Performance </a:t>
+            </a:r>
+            <a:r>
+              <a:rPr lang="de-DE" sz="4000" dirty="0"/>
+              <a:t>(gemessen durch das Graph </a:t>
             </a:r>
             <a:r>
               <a:rPr lang="de-DE" sz="4000" dirty="0" err="1"/>
-              <a:t>graph</a:t>
+              <a:t>Literacy</a:t>
             </a:r>
             <a:r>
               <a:rPr lang="de-DE" sz="4000" dirty="0"/>
-              <a:t> </a:t>
-            </a:r>
-            <a:r>
-              <a:rPr lang="de-DE" sz="4000" dirty="0" err="1"/>
-              <a:t>literacy</a:t>
-            </a:r>
-            <a:r>
-              <a:rPr lang="de-DE" sz="4000" dirty="0"/>
-              <a:t> die </a:t>
-            </a:r>
-            <a:r>
-              <a:rPr lang="de-DE" sz="4000" dirty="0" err="1"/>
-              <a:t>graph</a:t>
-            </a:r>
-            <a:r>
-              <a:rPr lang="de-DE" sz="4000" dirty="0"/>
-              <a:t> </a:t>
-            </a:r>
-            <a:r>
-              <a:rPr lang="de-DE" sz="4000" dirty="0" err="1"/>
-              <a:t>literacy</a:t>
-            </a:r>
-            <a:r>
-              <a:rPr lang="de-DE" sz="4000" dirty="0"/>
-              <a:t> Level? </a:t>
-            </a:r>
-          </a:p>
-          <a:p>
-            <a:pPr algn="just"/>
-            <a:endParaRPr lang="de-DE" sz="4000" dirty="0"/>
+              <a:t> Level)  während der Rezeption artifizieller Halbjahresnoten.?</a:t>
+            </a:r>
           </a:p>
         </p:txBody>
       </p:sp>
@@ -5253,7 +5359,7 @@
             <p:nvPr/>
           </p:nvPicPr>
           <p:blipFill>
-            <a:blip r:embed="rId5">
+            <a:blip r:embed="rId4">
               <a:clrChange>
                 <a:clrFrom>
                   <a:srgbClr val="FFFFFF"/>
@@ -5414,10 +5520,10 @@
             <p:nvPr/>
           </p:nvPicPr>
           <p:blipFill>
-            <a:blip r:embed="rId6">
+            <a:blip r:embed="rId5">
               <a:extLst>
                 <a:ext uri="{96DAC541-7B7A-43D3-8B79-37D633B846F1}">
-                  <asvg:svgBlip xmlns:asvg="http://schemas.microsoft.com/office/drawing/2016/SVG/main" r:embed="rId7"/>
+                  <asvg:svgBlip xmlns:asvg="http://schemas.microsoft.com/office/drawing/2016/SVG/main" r:embed="rId6"/>
                 </a:ext>
               </a:extLst>
             </a:blip>
@@ -5510,10 +5616,10 @@
             <p:nvPr/>
           </p:nvPicPr>
           <p:blipFill>
-            <a:blip r:embed="rId8">
+            <a:blip r:embed="rId7">
               <a:extLst>
                 <a:ext uri="{96DAC541-7B7A-43D3-8B79-37D633B846F1}">
-                  <asvg:svgBlip xmlns:asvg="http://schemas.microsoft.com/office/drawing/2016/SVG/main" r:embed="rId9"/>
+                  <asvg:svgBlip xmlns:asvg="http://schemas.microsoft.com/office/drawing/2016/SVG/main" r:embed="rId8"/>
                 </a:ext>
               </a:extLst>
             </a:blip>
@@ -5737,10 +5843,10 @@
       </p:sp>
       <p:sp>
         <p:nvSpPr>
-          <p:cNvPr id="86" name="Textfeld 85">
+          <p:cNvPr id="87" name="Textfeld 86">
             <a:extLst>
               <a:ext uri="{FF2B5EF4-FFF2-40B4-BE49-F238E27FC236}">
-                <a16:creationId xmlns:a16="http://schemas.microsoft.com/office/drawing/2014/main" id="{BD0E819C-1CAB-317D-5258-B26AA19176C0}"/>
+                <a16:creationId xmlns:a16="http://schemas.microsoft.com/office/drawing/2014/main" id="{C902DF6B-E704-D19D-B95C-04A3703E42B4}"/>
               </a:ext>
             </a:extLst>
           </p:cNvPr>
@@ -5749,8 +5855,8 @@
         </p:nvSpPr>
         <p:spPr>
           <a:xfrm>
-            <a:off x="8593953" y="19773911"/>
-            <a:ext cx="12485687" cy="2554545"/>
+            <a:off x="21818889" y="20399272"/>
+            <a:ext cx="8129026" cy="4154984"/>
           </a:xfrm>
           <a:prstGeom prst="rect">
             <a:avLst/>
@@ -5763,6 +5869,118 @@
           </a:bodyPr>
           <a:lstStyle/>
           <a:p>
+            <a:pPr algn="ctr"/>
+            <a:r>
+              <a:rPr kumimoji="0" lang="de-DE" sz="4000" b="1" i="0" u="sng" strike="noStrike" kern="1200" cap="none" spc="0" normalizeH="0" baseline="0" noProof="0" dirty="0">
+                <a:ln>
+                  <a:noFill/>
+                </a:ln>
+                <a:solidFill>
+                  <a:prstClr val="black"/>
+                </a:solidFill>
+                <a:effectLst/>
+                <a:uLnTx/>
+                <a:uFillTx/>
+                <a:latin typeface="Calibri"/>
+                <a:ea typeface="+mn-ea"/>
+                <a:cs typeface="+mn-cs"/>
+                <a:sym typeface="Wingdings" panose="05000000000000000000" pitchFamily="2" charset="2"/>
+              </a:rPr>
+              <a:t>Auswertung</a:t>
+            </a:r>
+            <a:r>
+              <a:rPr kumimoji="0" lang="de-DE" sz="4000" i="0" strike="noStrike" kern="1200" cap="none" spc="0" normalizeH="0" baseline="0" noProof="0" dirty="0">
+                <a:ln>
+                  <a:noFill/>
+                </a:ln>
+                <a:solidFill>
+                  <a:prstClr val="black"/>
+                </a:solidFill>
+                <a:effectLst/>
+                <a:uLnTx/>
+                <a:uFillTx/>
+                <a:latin typeface="Calibri"/>
+                <a:ea typeface="+mn-ea"/>
+                <a:cs typeface="+mn-cs"/>
+                <a:sym typeface="Wingdings" panose="05000000000000000000" pitchFamily="2" charset="2"/>
+              </a:rPr>
+              <a:t>: </a:t>
+            </a:r>
+            <a:r>
+              <a:rPr lang="de-DE" sz="4000" dirty="0" err="1">
+                <a:solidFill>
+                  <a:prstClr val="black"/>
+                </a:solidFill>
+                <a:latin typeface="Calibri"/>
+                <a:sym typeface="Wingdings" panose="05000000000000000000" pitchFamily="2" charset="2"/>
+              </a:rPr>
+              <a:t>Bayesianische</a:t>
+            </a:r>
+            <a:r>
+              <a:rPr lang="de-DE" sz="4000" dirty="0">
+                <a:solidFill>
+                  <a:prstClr val="black"/>
+                </a:solidFill>
+                <a:latin typeface="Calibri"/>
+                <a:sym typeface="Wingdings" panose="05000000000000000000" pitchFamily="2" charset="2"/>
+              </a:rPr>
+              <a:t> Mehrebenen-</a:t>
+            </a:r>
+            <a:r>
+              <a:rPr lang="de-DE" sz="4000" dirty="0" err="1">
+                <a:solidFill>
+                  <a:prstClr val="black"/>
+                </a:solidFill>
+                <a:latin typeface="Calibri"/>
+                <a:sym typeface="Wingdings" panose="05000000000000000000" pitchFamily="2" charset="2"/>
+              </a:rPr>
+              <a:t>Poissonregression</a:t>
+            </a:r>
+            <a:endParaRPr lang="de-DE" sz="4000" dirty="0">
+              <a:solidFill>
+                <a:prstClr val="black"/>
+              </a:solidFill>
+              <a:latin typeface="Calibri"/>
+              <a:sym typeface="Wingdings" panose="05000000000000000000" pitchFamily="2" charset="2"/>
+            </a:endParaRPr>
+          </a:p>
+          <a:p>
+            <a:pPr algn="ctr"/>
+            <a:endParaRPr kumimoji="0" lang="de-DE" sz="2400" i="0" strike="noStrike" kern="1200" cap="none" spc="0" normalizeH="0" baseline="0" noProof="0" dirty="0">
+              <a:ln>
+                <a:noFill/>
+              </a:ln>
+              <a:solidFill>
+                <a:prstClr val="black"/>
+              </a:solidFill>
+              <a:effectLst/>
+              <a:uLnTx/>
+              <a:uFillTx/>
+              <a:latin typeface="Calibri"/>
+              <a:ea typeface="+mn-ea"/>
+              <a:cs typeface="+mn-cs"/>
+              <a:sym typeface="Wingdings" panose="05000000000000000000" pitchFamily="2" charset="2"/>
+            </a:endParaRPr>
+          </a:p>
+          <a:p>
+            <a:r>
+              <a:rPr kumimoji="0" lang="de-DE" sz="4000" b="1" i="0" u="none" strike="noStrike" kern="1200" cap="none" spc="0" normalizeH="0" baseline="0" noProof="0" dirty="0">
+                <a:ln>
+                  <a:noFill/>
+                </a:ln>
+                <a:solidFill>
+                  <a:prstClr val="black"/>
+                </a:solidFill>
+                <a:effectLst/>
+                <a:uLnTx/>
+                <a:uFillTx/>
+                <a:latin typeface="Calibri"/>
+                <a:ea typeface="+mn-ea"/>
+                <a:cs typeface="+mn-cs"/>
+                <a:sym typeface="Wingdings" panose="05000000000000000000" pitchFamily="2" charset="2"/>
+              </a:rPr>
+              <a:t>FF 1</a:t>
+            </a:r>
             <a:r>
               <a:rPr kumimoji="0" lang="de-DE" sz="4000" b="0" i="0" u="none" strike="noStrike" kern="1200" cap="none" spc="0" normalizeH="0" baseline="0" noProof="0" dirty="0">
                 <a:ln>
@@ -5779,7 +5997,7 @@
                 <a:cs typeface="+mn-cs"/>
                 <a:sym typeface="Wingdings" panose="05000000000000000000" pitchFamily="2" charset="2"/>
               </a:rPr>
-              <a:t>Ausreißer (1), </a:t>
+              <a:t>: </a:t>
             </a:r>
             <a:r>
               <a:rPr kumimoji="0" lang="de-DE" sz="4000" b="0" i="0" u="none" strike="noStrike" kern="1200" cap="none" spc="0" normalizeH="0" baseline="0" noProof="0" dirty="0" err="1">
@@ -5797,7 +6015,7 @@
                 <a:cs typeface="+mn-cs"/>
                 <a:sym typeface="Wingdings" panose="05000000000000000000" pitchFamily="2" charset="2"/>
               </a:rPr>
-              <a:t>Bimodalität</a:t>
+              <a:t>Conditional</a:t>
             </a:r>
             <a:r>
               <a:rPr kumimoji="0" lang="de-DE" sz="4000" b="0" i="0" u="none" strike="noStrike" kern="1200" cap="none" spc="0" normalizeH="0" baseline="0" noProof="0" dirty="0">
@@ -5815,10 +6033,26 @@
                 <a:cs typeface="+mn-cs"/>
                 <a:sym typeface="Wingdings" panose="05000000000000000000" pitchFamily="2" charset="2"/>
               </a:rPr>
-              <a:t> (2), Schiefe (3), Mittelwertsdifferenz (4), </a:t>
-            </a:r>
-          </a:p>
-          <a:p>
+              <a:t> </a:t>
+            </a:r>
+            <a:r>
+              <a:rPr kumimoji="0" lang="de-DE" sz="4000" b="0" i="0" u="none" strike="noStrike" kern="1200" cap="none" spc="0" normalizeH="0" baseline="0" noProof="0" dirty="0" err="1">
+                <a:ln>
+                  <a:noFill/>
+                </a:ln>
+                <a:solidFill>
+                  <a:prstClr val="black"/>
+                </a:solidFill>
+                <a:effectLst/>
+                <a:uLnTx/>
+                <a:uFillTx/>
+                <a:latin typeface="Calibri"/>
+                <a:ea typeface="+mn-ea"/>
+                <a:cs typeface="+mn-cs"/>
+                <a:sym typeface="Wingdings" panose="05000000000000000000" pitchFamily="2" charset="2"/>
+              </a:rPr>
+              <a:t>Effects</a:t>
+            </a:r>
             <a:r>
               <a:rPr kumimoji="0" lang="de-DE" sz="4000" b="0" i="0" u="none" strike="noStrike" kern="1200" cap="none" spc="0" normalizeH="0" baseline="0" noProof="0" dirty="0">
                 <a:ln>
@@ -5835,7 +6069,19 @@
                 <a:cs typeface="+mn-cs"/>
                 <a:sym typeface="Wingdings" panose="05000000000000000000" pitchFamily="2" charset="2"/>
               </a:rPr>
-              <a:t>Streuung als Wertebereich (5), als Abstand zum Mittelwert (</a:t>
+              <a:t> </a:t>
+            </a:r>
+          </a:p>
+          <a:p>
+            <a:r>
+              <a:rPr lang="de-DE" sz="4000" b="1" dirty="0">
+                <a:solidFill>
+                  <a:prstClr val="black"/>
+                </a:solidFill>
+                <a:latin typeface="Calibri"/>
+                <a:sym typeface="Wingdings" panose="05000000000000000000" pitchFamily="2" charset="2"/>
+              </a:rPr>
+              <a:t>FF 2</a:t>
             </a:r>
             <a:r>
               <a:rPr lang="de-DE" sz="4000" dirty="0">
@@ -5845,25 +6091,17 @@
                 <a:latin typeface="Calibri"/>
                 <a:sym typeface="Wingdings" panose="05000000000000000000" pitchFamily="2" charset="2"/>
               </a:rPr>
-              <a:t>6</a:t>
-            </a:r>
-            <a:r>
-              <a:rPr kumimoji="0" lang="de-DE" sz="4000" b="0" i="0" u="none" strike="noStrike" kern="1200" cap="none" spc="0" normalizeH="0" baseline="0" noProof="0" dirty="0">
-                <a:ln>
-                  <a:noFill/>
-                </a:ln>
+              <a:t>: </a:t>
+            </a:r>
+            <a:r>
+              <a:rPr lang="de-DE" sz="4000" dirty="0" err="1">
                 <a:solidFill>
                   <a:prstClr val="black"/>
                 </a:solidFill>
-                <a:effectLst/>
-                <a:uLnTx/>
-                <a:uFillTx/>
                 <a:latin typeface="Calibri"/>
-                <a:ea typeface="+mn-ea"/>
-                <a:cs typeface="+mn-cs"/>
                 <a:sym typeface="Wingdings" panose="05000000000000000000" pitchFamily="2" charset="2"/>
               </a:rPr>
-              <a:t>) und nicht näher spezifiziert (</a:t>
+              <a:t>Incidence</a:t>
             </a:r>
             <a:r>
               <a:rPr lang="de-DE" sz="4000" dirty="0">
@@ -5873,126 +6111,17 @@
                 <a:latin typeface="Calibri"/>
                 <a:sym typeface="Wingdings" panose="05000000000000000000" pitchFamily="2" charset="2"/>
               </a:rPr>
-              <a:t>7</a:t>
-            </a:r>
-            <a:r>
-              <a:rPr kumimoji="0" lang="de-DE" sz="4000" b="0" i="0" u="none" strike="noStrike" kern="1200" cap="none" spc="0" normalizeH="0" baseline="0" noProof="0" dirty="0">
-                <a:ln>
-                  <a:noFill/>
-                </a:ln>
-                <a:solidFill>
-                  <a:prstClr val="black"/>
-                </a:solidFill>
-                <a:effectLst/>
-                <a:uLnTx/>
-                <a:uFillTx/>
-                <a:latin typeface="Calibri"/>
-                <a:ea typeface="+mn-ea"/>
-                <a:cs typeface="+mn-cs"/>
-                <a:sym typeface="Wingdings" panose="05000000000000000000" pitchFamily="2" charset="2"/>
-              </a:rPr>
-              <a:t>)</a:t>
-            </a:r>
-            <a:endParaRPr lang="de-DE" dirty="0"/>
-          </a:p>
-        </p:txBody>
-      </p:sp>
-      <p:sp>
-        <p:nvSpPr>
-          <p:cNvPr id="87" name="Textfeld 86">
-            <a:extLst>
-              <a:ext uri="{FF2B5EF4-FFF2-40B4-BE49-F238E27FC236}">
-                <a16:creationId xmlns:a16="http://schemas.microsoft.com/office/drawing/2014/main" id="{C902DF6B-E704-D19D-B95C-04A3703E42B4}"/>
-              </a:ext>
-            </a:extLst>
-          </p:cNvPr>
-          <p:cNvSpPr txBox="1"/>
-          <p:nvPr/>
-        </p:nvSpPr>
-        <p:spPr>
-          <a:xfrm>
-            <a:off x="21929373" y="20399272"/>
-            <a:ext cx="7014374" cy="3785652"/>
-          </a:xfrm>
-          <a:prstGeom prst="rect">
-            <a:avLst/>
-          </a:prstGeom>
-          <a:noFill/>
-        </p:spPr>
-        <p:txBody>
-          <a:bodyPr wrap="square">
-            <a:spAutoFit/>
-          </a:bodyPr>
-          <a:lstStyle/>
-          <a:p>
-            <a:pPr algn="ctr"/>
-            <a:r>
-              <a:rPr kumimoji="0" lang="de-DE" sz="4000" b="1" i="0" u="sng" strike="noStrike" kern="1200" cap="none" spc="0" normalizeH="0" baseline="0" noProof="0" dirty="0">
-                <a:ln>
-                  <a:noFill/>
-                </a:ln>
-                <a:solidFill>
-                  <a:prstClr val="black"/>
-                </a:solidFill>
-                <a:effectLst/>
-                <a:uLnTx/>
-                <a:uFillTx/>
-                <a:latin typeface="Calibri"/>
-                <a:ea typeface="+mn-ea"/>
-                <a:cs typeface="+mn-cs"/>
-                <a:sym typeface="Wingdings" panose="05000000000000000000" pitchFamily="2" charset="2"/>
-              </a:rPr>
-              <a:t>Auswertung</a:t>
-            </a:r>
-          </a:p>
-          <a:p>
-            <a:r>
-              <a:rPr kumimoji="0" lang="de-DE" sz="4000" b="1" i="0" u="none" strike="noStrike" kern="1200" cap="none" spc="0" normalizeH="0" baseline="0" noProof="0" dirty="0">
-                <a:ln>
-                  <a:noFill/>
-                </a:ln>
-                <a:solidFill>
-                  <a:prstClr val="black"/>
-                </a:solidFill>
-                <a:effectLst/>
-                <a:uLnTx/>
-                <a:uFillTx/>
-                <a:latin typeface="Calibri"/>
-                <a:ea typeface="+mn-ea"/>
-                <a:cs typeface="+mn-cs"/>
-                <a:sym typeface="Wingdings" panose="05000000000000000000" pitchFamily="2" charset="2"/>
-              </a:rPr>
-              <a:t>FF 1</a:t>
-            </a:r>
-            <a:r>
-              <a:rPr kumimoji="0" lang="de-DE" sz="4000" b="0" i="0" u="none" strike="noStrike" kern="1200" cap="none" spc="0" normalizeH="0" baseline="0" noProof="0" dirty="0">
-                <a:ln>
-                  <a:noFill/>
-                </a:ln>
-                <a:solidFill>
-                  <a:prstClr val="black"/>
-                </a:solidFill>
-                <a:effectLst/>
-                <a:uLnTx/>
-                <a:uFillTx/>
-                <a:latin typeface="Calibri"/>
-                <a:ea typeface="+mn-ea"/>
-                <a:cs typeface="+mn-cs"/>
-                <a:sym typeface="Wingdings" panose="05000000000000000000" pitchFamily="2" charset="2"/>
-              </a:rPr>
-              <a:t>: Deskriptiv</a:t>
-            </a:r>
-          </a:p>
-          <a:p>
-            <a:r>
-              <a:rPr lang="de-DE" sz="4000" b="1" dirty="0">
+              <a:t> </a:t>
+            </a:r>
+            <a:r>
+              <a:rPr lang="de-DE" sz="4000" dirty="0" err="1">
                 <a:solidFill>
                   <a:prstClr val="black"/>
                 </a:solidFill>
                 <a:latin typeface="Calibri"/>
                 <a:sym typeface="Wingdings" panose="05000000000000000000" pitchFamily="2" charset="2"/>
               </a:rPr>
-              <a:t>FF 2</a:t>
+              <a:t>Ratios</a:t>
             </a:r>
             <a:r>
               <a:rPr lang="de-DE" sz="4000" dirty="0">
@@ -6002,45 +6131,8 @@
                 <a:latin typeface="Calibri"/>
                 <a:sym typeface="Wingdings" panose="05000000000000000000" pitchFamily="2" charset="2"/>
               </a:rPr>
-              <a:t>: </a:t>
-            </a:r>
-            <a:r>
-              <a:rPr lang="de-DE" sz="4000" dirty="0" err="1">
-                <a:solidFill>
-                  <a:prstClr val="black"/>
-                </a:solidFill>
-                <a:latin typeface="Calibri"/>
-                <a:sym typeface="Wingdings" panose="05000000000000000000" pitchFamily="2" charset="2"/>
-              </a:rPr>
-              <a:t>Bayesianische</a:t>
-            </a:r>
-            <a:r>
-              <a:rPr lang="de-DE" sz="4000" dirty="0">
-                <a:solidFill>
-                  <a:prstClr val="black"/>
-                </a:solidFill>
-                <a:latin typeface="Calibri"/>
-                <a:sym typeface="Wingdings" panose="05000000000000000000" pitchFamily="2" charset="2"/>
-              </a:rPr>
-              <a:t> Mehrebenen-</a:t>
-            </a:r>
-            <a:r>
-              <a:rPr lang="de-DE" sz="4000" dirty="0" err="1">
-                <a:solidFill>
-                  <a:prstClr val="black"/>
-                </a:solidFill>
-                <a:latin typeface="Calibri"/>
-                <a:sym typeface="Wingdings" panose="05000000000000000000" pitchFamily="2" charset="2"/>
-              </a:rPr>
-              <a:t>Poissonregression</a:t>
-            </a:r>
-            <a:endParaRPr lang="de-DE" sz="4000" dirty="0">
-              <a:solidFill>
-                <a:prstClr val="black"/>
-              </a:solidFill>
-              <a:latin typeface="Calibri"/>
-              <a:sym typeface="Wingdings" panose="05000000000000000000" pitchFamily="2" charset="2"/>
-            </a:endParaRPr>
+              <a:t> </a:t>
+            </a:r>
           </a:p>
           <a:p>
             <a:r>
@@ -6102,9 +6194,9 @@
         <p:grpSpPr>
           <a:xfrm>
             <a:off x="5952443" y="19749857"/>
-            <a:ext cx="2475428" cy="2599978"/>
+            <a:ext cx="2475428" cy="2660864"/>
             <a:chOff x="13920710" y="24047559"/>
-            <a:chExt cx="2475428" cy="2599978"/>
+            <a:chExt cx="2475428" cy="2660864"/>
           </a:xfrm>
         </p:grpSpPr>
         <p:grpSp>
@@ -6122,9 +6214,9 @@
           <p:grpSpPr>
             <a:xfrm>
               <a:off x="14111181" y="24047559"/>
-              <a:ext cx="2284957" cy="2599978"/>
+              <a:ext cx="2284957" cy="2660864"/>
               <a:chOff x="14111181" y="24047559"/>
-              <a:chExt cx="2284957" cy="2599978"/>
+              <a:chExt cx="2284957" cy="2660864"/>
             </a:xfrm>
           </p:grpSpPr>
           <p:pic>
@@ -6142,10 +6234,10 @@
               <p:nvPr/>
             </p:nvPicPr>
             <p:blipFill>
-              <a:blip r:embed="rId10">
+              <a:blip r:embed="rId9">
                 <a:extLst>
                   <a:ext uri="{96DAC541-7B7A-43D3-8B79-37D633B846F1}">
-                    <asvg:svgBlip xmlns:asvg="http://schemas.microsoft.com/office/drawing/2016/SVG/main" r:embed="rId11"/>
+                    <asvg:svgBlip xmlns:asvg="http://schemas.microsoft.com/office/drawing/2016/SVG/main" r:embed="rId10"/>
                   </a:ext>
                 </a:extLst>
               </a:blip>
@@ -6178,10 +6270,10 @@
               <p:nvPr/>
             </p:nvPicPr>
             <p:blipFill>
-              <a:blip r:embed="rId12">
+              <a:blip r:embed="rId11">
                 <a:extLst>
                   <a:ext uri="{96DAC541-7B7A-43D3-8B79-37D633B846F1}">
-                    <asvg:svgBlip xmlns:asvg="http://schemas.microsoft.com/office/drawing/2016/SVG/main" r:embed="rId13"/>
+                    <asvg:svgBlip xmlns:asvg="http://schemas.microsoft.com/office/drawing/2016/SVG/main" r:embed="rId12"/>
                   </a:ext>
                 </a:extLst>
               </a:blip>
@@ -6191,7 +6283,7 @@
             </p:blipFill>
             <p:spPr>
               <a:xfrm>
-                <a:off x="15181313" y="25896246"/>
+                <a:off x="15094866" y="25873980"/>
                 <a:ext cx="788785" cy="751291"/>
               </a:xfrm>
               <a:prstGeom prst="rect">
@@ -6214,10 +6306,10 @@
               <p:nvPr/>
             </p:nvPicPr>
             <p:blipFill>
-              <a:blip r:embed="rId14">
+              <a:blip r:embed="rId13">
                 <a:extLst>
                   <a:ext uri="{96DAC541-7B7A-43D3-8B79-37D633B846F1}">
-                    <asvg:svgBlip xmlns:asvg="http://schemas.microsoft.com/office/drawing/2016/SVG/main" r:embed="rId15"/>
+                    <asvg:svgBlip xmlns:asvg="http://schemas.microsoft.com/office/drawing/2016/SVG/main" r:embed="rId14"/>
                   </a:ext>
                 </a:extLst>
               </a:blip>
@@ -6250,10 +6342,10 @@
               <p:nvPr/>
             </p:nvPicPr>
             <p:blipFill>
-              <a:blip r:embed="rId16">
+              <a:blip r:embed="rId15">
                 <a:extLst>
                   <a:ext uri="{96DAC541-7B7A-43D3-8B79-37D633B846F1}">
-                    <asvg:svgBlip xmlns:asvg="http://schemas.microsoft.com/office/drawing/2016/SVG/main" r:embed="rId17"/>
+                    <asvg:svgBlip xmlns:asvg="http://schemas.microsoft.com/office/drawing/2016/SVG/main" r:embed="rId16"/>
                   </a:ext>
                 </a:extLst>
               </a:blip>
@@ -6286,10 +6378,10 @@
               <p:nvPr/>
             </p:nvPicPr>
             <p:blipFill>
-              <a:blip r:embed="rId18">
+              <a:blip r:embed="rId17">
                 <a:extLst>
                   <a:ext uri="{96DAC541-7B7A-43D3-8B79-37D633B846F1}">
-                    <asvg:svgBlip xmlns:asvg="http://schemas.microsoft.com/office/drawing/2016/SVG/main" r:embed="rId19"/>
+                    <asvg:svgBlip xmlns:asvg="http://schemas.microsoft.com/office/drawing/2016/SVG/main" r:embed="rId18"/>
                   </a:ext>
                 </a:extLst>
               </a:blip>
@@ -6322,10 +6414,10 @@
               <p:nvPr/>
             </p:nvPicPr>
             <p:blipFill>
-              <a:blip r:embed="rId20">
+              <a:blip r:embed="rId19">
                 <a:extLst>
                   <a:ext uri="{96DAC541-7B7A-43D3-8B79-37D633B846F1}">
-                    <asvg:svgBlip xmlns:asvg="http://schemas.microsoft.com/office/drawing/2016/SVG/main" r:embed="rId21"/>
+                    <asvg:svgBlip xmlns:asvg="http://schemas.microsoft.com/office/drawing/2016/SVG/main" r:embed="rId20"/>
                   </a:ext>
                 </a:extLst>
               </a:blip>
@@ -6335,7 +6427,7 @@
             </p:blipFill>
             <p:spPr>
               <a:xfrm>
-                <a:off x="14505572" y="25889255"/>
+                <a:off x="14420116" y="25957132"/>
                 <a:ext cx="788785" cy="751291"/>
               </a:xfrm>
               <a:prstGeom prst="rect">
@@ -6358,10 +6450,10 @@
               <p:nvPr/>
             </p:nvPicPr>
             <p:blipFill>
-              <a:blip r:embed="rId22">
+              <a:blip r:embed="rId21">
                 <a:extLst>
                   <a:ext uri="{96DAC541-7B7A-43D3-8B79-37D633B846F1}">
-                    <asvg:svgBlip xmlns:asvg="http://schemas.microsoft.com/office/drawing/2016/SVG/main" r:embed="rId23"/>
+                    <asvg:svgBlip xmlns:asvg="http://schemas.microsoft.com/office/drawing/2016/SVG/main" r:embed="rId22"/>
                   </a:ext>
                 </a:extLst>
               </a:blip>
@@ -6395,10 +6487,10 @@
             <p:nvPr/>
           </p:nvPicPr>
           <p:blipFill>
-            <a:blip r:embed="rId24">
+            <a:blip r:embed="rId23">
               <a:extLst>
                 <a:ext uri="{96DAC541-7B7A-43D3-8B79-37D633B846F1}">
-                  <asvg:svgBlip xmlns:asvg="http://schemas.microsoft.com/office/drawing/2016/SVG/main" r:embed="rId25"/>
+                  <asvg:svgBlip xmlns:asvg="http://schemas.microsoft.com/office/drawing/2016/SVG/main" r:embed="rId24"/>
                 </a:ext>
               </a:extLst>
             </a:blip>
@@ -6452,7 +6544,7 @@
             <p:nvPr/>
           </p:nvPicPr>
           <p:blipFill>
-            <a:blip r:embed="rId26">
+            <a:blip r:embed="rId25">
               <a:clrChange>
                 <a:clrFrom>
                   <a:srgbClr val="FFFFFF"/>
@@ -6493,10 +6585,10 @@
             <p:nvPr/>
           </p:nvPicPr>
           <p:blipFill>
-            <a:blip r:embed="rId10">
+            <a:blip r:embed="rId9">
               <a:extLst>
                 <a:ext uri="{96DAC541-7B7A-43D3-8B79-37D633B846F1}">
-                  <asvg:svgBlip xmlns:asvg="http://schemas.microsoft.com/office/drawing/2016/SVG/main" r:embed="rId11"/>
+                  <asvg:svgBlip xmlns:asvg="http://schemas.microsoft.com/office/drawing/2016/SVG/main" r:embed="rId10"/>
                 </a:ext>
               </a:extLst>
             </a:blip>
@@ -6529,10 +6621,10 @@
             <p:nvPr/>
           </p:nvPicPr>
           <p:blipFill>
-            <a:blip r:embed="rId12">
+            <a:blip r:embed="rId11">
               <a:extLst>
                 <a:ext uri="{96DAC541-7B7A-43D3-8B79-37D633B846F1}">
-                  <asvg:svgBlip xmlns:asvg="http://schemas.microsoft.com/office/drawing/2016/SVG/main" r:embed="rId13"/>
+                  <asvg:svgBlip xmlns:asvg="http://schemas.microsoft.com/office/drawing/2016/SVG/main" r:embed="rId12"/>
                 </a:ext>
               </a:extLst>
             </a:blip>
@@ -6565,10 +6657,10 @@
             <p:nvPr/>
           </p:nvPicPr>
           <p:blipFill>
-            <a:blip r:embed="rId14">
+            <a:blip r:embed="rId13">
               <a:extLst>
                 <a:ext uri="{96DAC541-7B7A-43D3-8B79-37D633B846F1}">
-                  <asvg:svgBlip xmlns:asvg="http://schemas.microsoft.com/office/drawing/2016/SVG/main" r:embed="rId15"/>
+                  <asvg:svgBlip xmlns:asvg="http://schemas.microsoft.com/office/drawing/2016/SVG/main" r:embed="rId14"/>
                 </a:ext>
               </a:extLst>
             </a:blip>
@@ -6601,10 +6693,10 @@
             <p:nvPr/>
           </p:nvPicPr>
           <p:blipFill>
-            <a:blip r:embed="rId16">
+            <a:blip r:embed="rId15">
               <a:extLst>
                 <a:ext uri="{96DAC541-7B7A-43D3-8B79-37D633B846F1}">
-                  <asvg:svgBlip xmlns:asvg="http://schemas.microsoft.com/office/drawing/2016/SVG/main" r:embed="rId17"/>
+                  <asvg:svgBlip xmlns:asvg="http://schemas.microsoft.com/office/drawing/2016/SVG/main" r:embed="rId16"/>
                 </a:ext>
               </a:extLst>
             </a:blip>
@@ -6637,10 +6729,10 @@
             <p:nvPr/>
           </p:nvPicPr>
           <p:blipFill>
-            <a:blip r:embed="rId18">
+            <a:blip r:embed="rId17">
               <a:extLst>
                 <a:ext uri="{96DAC541-7B7A-43D3-8B79-37D633B846F1}">
-                  <asvg:svgBlip xmlns:asvg="http://schemas.microsoft.com/office/drawing/2016/SVG/main" r:embed="rId19"/>
+                  <asvg:svgBlip xmlns:asvg="http://schemas.microsoft.com/office/drawing/2016/SVG/main" r:embed="rId18"/>
                 </a:ext>
               </a:extLst>
             </a:blip>
@@ -6673,10 +6765,10 @@
             <p:nvPr/>
           </p:nvPicPr>
           <p:blipFill>
-            <a:blip r:embed="rId20">
+            <a:blip r:embed="rId19">
               <a:extLst>
                 <a:ext uri="{96DAC541-7B7A-43D3-8B79-37D633B846F1}">
-                  <asvg:svgBlip xmlns:asvg="http://schemas.microsoft.com/office/drawing/2016/SVG/main" r:embed="rId21"/>
+                  <asvg:svgBlip xmlns:asvg="http://schemas.microsoft.com/office/drawing/2016/SVG/main" r:embed="rId20"/>
                 </a:ext>
               </a:extLst>
             </a:blip>
@@ -6709,10 +6801,10 @@
             <p:nvPr/>
           </p:nvPicPr>
           <p:blipFill>
-            <a:blip r:embed="rId22">
+            <a:blip r:embed="rId21">
               <a:extLst>
                 <a:ext uri="{96DAC541-7B7A-43D3-8B79-37D633B846F1}">
-                  <asvg:svgBlip xmlns:asvg="http://schemas.microsoft.com/office/drawing/2016/SVG/main" r:embed="rId23"/>
+                  <asvg:svgBlip xmlns:asvg="http://schemas.microsoft.com/office/drawing/2016/SVG/main" r:embed="rId22"/>
                 </a:ext>
               </a:extLst>
             </a:blip>
@@ -6746,7 +6838,7 @@
           <p:nvPr/>
         </p:nvPicPr>
         <p:blipFill>
-          <a:blip r:embed="rId27">
+          <a:blip r:embed="rId26">
             <a:extLst>
               <a:ext uri="{28A0092B-C50C-407E-A947-70E740481C1C}">
                 <a14:useLocalDpi xmlns:a14="http://schemas.microsoft.com/office/drawing/2010/main" val="0"/>
@@ -7111,7 +7203,7 @@
             <p:nvPr/>
           </p:nvPicPr>
           <p:blipFill>
-            <a:blip r:embed="rId28">
+            <a:blip r:embed="rId27">
               <a:clrChange>
                 <a:clrFrom>
                   <a:srgbClr val="FFFFFF"/>
@@ -7177,10 +7269,10 @@
             <p:nvPr/>
           </p:nvPicPr>
           <p:blipFill>
-            <a:blip r:embed="rId24">
+            <a:blip r:embed="rId23">
               <a:extLst>
                 <a:ext uri="{96DAC541-7B7A-43D3-8B79-37D633B846F1}">
-                  <asvg:svgBlip xmlns:asvg="http://schemas.microsoft.com/office/drawing/2016/SVG/main" r:embed="rId25"/>
+                  <asvg:svgBlip xmlns:asvg="http://schemas.microsoft.com/office/drawing/2016/SVG/main" r:embed="rId24"/>
                 </a:ext>
               </a:extLst>
             </a:blip>
@@ -7213,10 +7305,10 @@
             <p:nvPr/>
           </p:nvPicPr>
           <p:blipFill>
-            <a:blip r:embed="rId29">
+            <a:blip r:embed="rId28">
               <a:extLst>
                 <a:ext uri="{96DAC541-7B7A-43D3-8B79-37D633B846F1}">
-                  <asvg:svgBlip xmlns:asvg="http://schemas.microsoft.com/office/drawing/2016/SVG/main" r:embed="rId30"/>
+                  <asvg:svgBlip xmlns:asvg="http://schemas.microsoft.com/office/drawing/2016/SVG/main" r:embed="rId29"/>
                 </a:ext>
               </a:extLst>
             </a:blip>
@@ -7249,10 +7341,10 @@
             <p:nvPr/>
           </p:nvPicPr>
           <p:blipFill>
-            <a:blip r:embed="rId31">
+            <a:blip r:embed="rId30">
               <a:extLst>
                 <a:ext uri="{96DAC541-7B7A-43D3-8B79-37D633B846F1}">
-                  <asvg:svgBlip xmlns:asvg="http://schemas.microsoft.com/office/drawing/2016/SVG/main" r:embed="rId32"/>
+                  <asvg:svgBlip xmlns:asvg="http://schemas.microsoft.com/office/drawing/2016/SVG/main" r:embed="rId31"/>
                 </a:ext>
               </a:extLst>
             </a:blip>
@@ -7285,10 +7377,10 @@
             <p:nvPr/>
           </p:nvPicPr>
           <p:blipFill>
-            <a:blip r:embed="rId33">
+            <a:blip r:embed="rId32">
               <a:extLst>
                 <a:ext uri="{96DAC541-7B7A-43D3-8B79-37D633B846F1}">
-                  <asvg:svgBlip xmlns:asvg="http://schemas.microsoft.com/office/drawing/2016/SVG/main" r:embed="rId34"/>
+                  <asvg:svgBlip xmlns:asvg="http://schemas.microsoft.com/office/drawing/2016/SVG/main" r:embed="rId33"/>
                 </a:ext>
               </a:extLst>
             </a:blip>
@@ -7307,416 +7399,6 @@
           </p:spPr>
         </p:pic>
       </p:grpSp>
-      <p:sp>
-        <p:nvSpPr>
-          <p:cNvPr id="121" name="Textfeld 120">
-            <a:extLst>
-              <a:ext uri="{FF2B5EF4-FFF2-40B4-BE49-F238E27FC236}">
-                <a16:creationId xmlns:a16="http://schemas.microsoft.com/office/drawing/2014/main" id="{3D9194FF-EC98-62BE-2DAB-AD75C90ADBA1}"/>
-              </a:ext>
-            </a:extLst>
-          </p:cNvPr>
-          <p:cNvSpPr txBox="1"/>
-          <p:nvPr/>
-        </p:nvSpPr>
-        <p:spPr>
-          <a:xfrm>
-            <a:off x="7240634" y="22816467"/>
-            <a:ext cx="10827110" cy="1323439"/>
-          </a:xfrm>
-          <a:prstGeom prst="rect">
-            <a:avLst/>
-          </a:prstGeom>
-          <a:noFill/>
-        </p:spPr>
-        <p:txBody>
-          <a:bodyPr wrap="square">
-            <a:spAutoFit/>
-          </a:bodyPr>
-          <a:lstStyle/>
-          <a:p>
-            <a:r>
-              <a:rPr kumimoji="0" lang="de-DE" sz="4000" b="0" i="0" u="none" strike="noStrike" kern="1200" cap="none" spc="0" normalizeH="0" baseline="0" noProof="0" dirty="0">
-                <a:ln>
-                  <a:noFill/>
-                </a:ln>
-                <a:solidFill>
-                  <a:prstClr val="black"/>
-                </a:solidFill>
-                <a:effectLst/>
-                <a:uLnTx/>
-                <a:uFillTx/>
-                <a:latin typeface="Calibri"/>
-                <a:ea typeface="+mn-ea"/>
-                <a:cs typeface="+mn-cs"/>
-                <a:sym typeface="Wingdings" panose="05000000000000000000" pitchFamily="2" charset="2"/>
-              </a:rPr>
-              <a:t>Reading </a:t>
-            </a:r>
-            <a:r>
-              <a:rPr kumimoji="0" lang="de-DE" sz="4000" b="0" i="0" u="none" strike="noStrike" kern="1200" cap="none" spc="0" normalizeH="0" baseline="0" noProof="0" dirty="0" err="1">
-                <a:ln>
-                  <a:noFill/>
-                </a:ln>
-                <a:solidFill>
-                  <a:prstClr val="black"/>
-                </a:solidFill>
-                <a:effectLst/>
-                <a:uLnTx/>
-                <a:uFillTx/>
-                <a:latin typeface="Calibri"/>
-                <a:ea typeface="+mn-ea"/>
-                <a:cs typeface="+mn-cs"/>
-                <a:sym typeface="Wingdings" panose="05000000000000000000" pitchFamily="2" charset="2"/>
-              </a:rPr>
-              <a:t>the</a:t>
-            </a:r>
-            <a:r>
-              <a:rPr kumimoji="0" lang="de-DE" sz="4000" b="0" i="0" u="none" strike="noStrike" kern="1200" cap="none" spc="0" normalizeH="0" baseline="0" noProof="0" dirty="0">
-                <a:ln>
-                  <a:noFill/>
-                </a:ln>
-                <a:solidFill>
-                  <a:prstClr val="black"/>
-                </a:solidFill>
-                <a:effectLst/>
-                <a:uLnTx/>
-                <a:uFillTx/>
-                <a:latin typeface="Calibri"/>
-                <a:ea typeface="+mn-ea"/>
-                <a:cs typeface="+mn-cs"/>
-                <a:sym typeface="Wingdings" panose="05000000000000000000" pitchFamily="2" charset="2"/>
-              </a:rPr>
-              <a:t> </a:t>
-            </a:r>
-            <a:r>
-              <a:rPr kumimoji="0" lang="de-DE" sz="4000" b="0" i="0" u="none" strike="noStrike" kern="1200" cap="none" spc="0" normalizeH="0" baseline="0" noProof="0" dirty="0" err="1">
-                <a:ln>
-                  <a:noFill/>
-                </a:ln>
-                <a:solidFill>
-                  <a:prstClr val="black"/>
-                </a:solidFill>
-                <a:effectLst/>
-                <a:uLnTx/>
-                <a:uFillTx/>
-                <a:latin typeface="Calibri"/>
-                <a:ea typeface="+mn-ea"/>
-                <a:cs typeface="+mn-cs"/>
-                <a:sym typeface="Wingdings" panose="05000000000000000000" pitchFamily="2" charset="2"/>
-              </a:rPr>
-              <a:t>data</a:t>
-            </a:r>
-            <a:r>
-              <a:rPr kumimoji="0" lang="de-DE" sz="4000" b="0" i="0" u="none" strike="noStrike" kern="1200" cap="none" spc="0" normalizeH="0" baseline="0" noProof="0" dirty="0">
-                <a:ln>
-                  <a:noFill/>
-                </a:ln>
-                <a:solidFill>
-                  <a:prstClr val="black"/>
-                </a:solidFill>
-                <a:effectLst/>
-                <a:uLnTx/>
-                <a:uFillTx/>
-                <a:latin typeface="Calibri"/>
-                <a:ea typeface="+mn-ea"/>
-                <a:cs typeface="+mn-cs"/>
-                <a:sym typeface="Wingdings" panose="05000000000000000000" pitchFamily="2" charset="2"/>
-              </a:rPr>
-              <a:t> (1), </a:t>
-            </a:r>
-            <a:r>
-              <a:rPr kumimoji="0" lang="de-DE" sz="4000" b="0" i="0" u="none" strike="noStrike" kern="1200" cap="none" spc="0" normalizeH="0" baseline="0" noProof="0" dirty="0" err="1">
-                <a:ln>
-                  <a:noFill/>
-                </a:ln>
-                <a:solidFill>
-                  <a:prstClr val="black"/>
-                </a:solidFill>
-                <a:effectLst/>
-                <a:uLnTx/>
-                <a:uFillTx/>
-                <a:latin typeface="Calibri"/>
-                <a:ea typeface="+mn-ea"/>
-                <a:cs typeface="+mn-cs"/>
-                <a:sym typeface="Wingdings" panose="05000000000000000000" pitchFamily="2" charset="2"/>
-              </a:rPr>
-              <a:t>reading</a:t>
-            </a:r>
-            <a:r>
-              <a:rPr kumimoji="0" lang="de-DE" sz="4000" b="0" i="0" u="none" strike="noStrike" kern="1200" cap="none" spc="0" normalizeH="0" baseline="0" noProof="0" dirty="0">
-                <a:ln>
-                  <a:noFill/>
-                </a:ln>
-                <a:solidFill>
-                  <a:prstClr val="black"/>
-                </a:solidFill>
-                <a:effectLst/>
-                <a:uLnTx/>
-                <a:uFillTx/>
-                <a:latin typeface="Calibri"/>
-                <a:ea typeface="+mn-ea"/>
-                <a:cs typeface="+mn-cs"/>
-                <a:sym typeface="Wingdings" panose="05000000000000000000" pitchFamily="2" charset="2"/>
-              </a:rPr>
-              <a:t> </a:t>
-            </a:r>
-            <a:r>
-              <a:rPr kumimoji="0" lang="de-DE" sz="4000" b="0" i="0" u="none" strike="noStrike" kern="1200" cap="none" spc="0" normalizeH="0" baseline="0" noProof="0" dirty="0" err="1">
-                <a:ln>
-                  <a:noFill/>
-                </a:ln>
-                <a:solidFill>
-                  <a:prstClr val="black"/>
-                </a:solidFill>
-                <a:effectLst/>
-                <a:uLnTx/>
-                <a:uFillTx/>
-                <a:latin typeface="Calibri"/>
-                <a:ea typeface="+mn-ea"/>
-                <a:cs typeface="+mn-cs"/>
-                <a:sym typeface="Wingdings" panose="05000000000000000000" pitchFamily="2" charset="2"/>
-              </a:rPr>
-              <a:t>between</a:t>
-            </a:r>
-            <a:r>
-              <a:rPr kumimoji="0" lang="de-DE" sz="4000" b="0" i="0" u="none" strike="noStrike" kern="1200" cap="none" spc="0" normalizeH="0" baseline="0" noProof="0" dirty="0">
-                <a:ln>
-                  <a:noFill/>
-                </a:ln>
-                <a:solidFill>
-                  <a:prstClr val="black"/>
-                </a:solidFill>
-                <a:effectLst/>
-                <a:uLnTx/>
-                <a:uFillTx/>
-                <a:latin typeface="Calibri"/>
-                <a:ea typeface="+mn-ea"/>
-                <a:cs typeface="+mn-cs"/>
-                <a:sym typeface="Wingdings" panose="05000000000000000000" pitchFamily="2" charset="2"/>
-              </a:rPr>
-              <a:t> </a:t>
-            </a:r>
-            <a:r>
-              <a:rPr kumimoji="0" lang="de-DE" sz="4000" b="0" i="0" u="none" strike="noStrike" kern="1200" cap="none" spc="0" normalizeH="0" baseline="0" noProof="0" dirty="0" err="1">
-                <a:ln>
-                  <a:noFill/>
-                </a:ln>
-                <a:solidFill>
-                  <a:prstClr val="black"/>
-                </a:solidFill>
-                <a:effectLst/>
-                <a:uLnTx/>
-                <a:uFillTx/>
-                <a:latin typeface="Calibri"/>
-                <a:ea typeface="+mn-ea"/>
-                <a:cs typeface="+mn-cs"/>
-                <a:sym typeface="Wingdings" panose="05000000000000000000" pitchFamily="2" charset="2"/>
-              </a:rPr>
-              <a:t>the</a:t>
-            </a:r>
-            <a:r>
-              <a:rPr kumimoji="0" lang="de-DE" sz="4000" b="0" i="0" u="none" strike="noStrike" kern="1200" cap="none" spc="0" normalizeH="0" baseline="0" noProof="0" dirty="0">
-                <a:ln>
-                  <a:noFill/>
-                </a:ln>
-                <a:solidFill>
-                  <a:prstClr val="black"/>
-                </a:solidFill>
-                <a:effectLst/>
-                <a:uLnTx/>
-                <a:uFillTx/>
-                <a:latin typeface="Calibri"/>
-                <a:ea typeface="+mn-ea"/>
-                <a:cs typeface="+mn-cs"/>
-                <a:sym typeface="Wingdings" panose="05000000000000000000" pitchFamily="2" charset="2"/>
-              </a:rPr>
-              <a:t> </a:t>
-            </a:r>
-            <a:r>
-              <a:rPr kumimoji="0" lang="de-DE" sz="4000" b="0" i="0" u="none" strike="noStrike" kern="1200" cap="none" spc="0" normalizeH="0" baseline="0" noProof="0" dirty="0" err="1">
-                <a:ln>
-                  <a:noFill/>
-                </a:ln>
-                <a:solidFill>
-                  <a:prstClr val="black"/>
-                </a:solidFill>
-                <a:effectLst/>
-                <a:uLnTx/>
-                <a:uFillTx/>
-                <a:latin typeface="Calibri"/>
-                <a:ea typeface="+mn-ea"/>
-                <a:cs typeface="+mn-cs"/>
-                <a:sym typeface="Wingdings" panose="05000000000000000000" pitchFamily="2" charset="2"/>
-              </a:rPr>
-              <a:t>data</a:t>
-            </a:r>
-            <a:r>
-              <a:rPr kumimoji="0" lang="de-DE" sz="4000" b="0" i="0" u="none" strike="noStrike" kern="1200" cap="none" spc="0" normalizeH="0" baseline="0" noProof="0" dirty="0">
-                <a:ln>
-                  <a:noFill/>
-                </a:ln>
-                <a:solidFill>
-                  <a:prstClr val="black"/>
-                </a:solidFill>
-                <a:effectLst/>
-                <a:uLnTx/>
-                <a:uFillTx/>
-                <a:latin typeface="Calibri"/>
-                <a:ea typeface="+mn-ea"/>
-                <a:cs typeface="+mn-cs"/>
-                <a:sym typeface="Wingdings" panose="05000000000000000000" pitchFamily="2" charset="2"/>
-              </a:rPr>
-              <a:t> (2), </a:t>
-            </a:r>
-            <a:r>
-              <a:rPr kumimoji="0" lang="de-DE" sz="4000" b="0" i="0" u="none" strike="noStrike" kern="1200" cap="none" spc="0" normalizeH="0" baseline="0" noProof="0" dirty="0" err="1">
-                <a:ln>
-                  <a:noFill/>
-                </a:ln>
-                <a:solidFill>
-                  <a:prstClr val="black"/>
-                </a:solidFill>
-                <a:effectLst/>
-                <a:uLnTx/>
-                <a:uFillTx/>
-                <a:latin typeface="Calibri"/>
-                <a:ea typeface="+mn-ea"/>
-                <a:cs typeface="+mn-cs"/>
-                <a:sym typeface="Wingdings" panose="05000000000000000000" pitchFamily="2" charset="2"/>
-              </a:rPr>
-              <a:t>reading</a:t>
-            </a:r>
-            <a:r>
-              <a:rPr kumimoji="0" lang="de-DE" sz="4000" b="0" i="0" u="none" strike="noStrike" kern="1200" cap="none" spc="0" normalizeH="0" baseline="0" noProof="0" dirty="0">
-                <a:ln>
-                  <a:noFill/>
-                </a:ln>
-                <a:solidFill>
-                  <a:prstClr val="black"/>
-                </a:solidFill>
-                <a:effectLst/>
-                <a:uLnTx/>
-                <a:uFillTx/>
-                <a:latin typeface="Calibri"/>
-                <a:ea typeface="+mn-ea"/>
-                <a:cs typeface="+mn-cs"/>
-                <a:sym typeface="Wingdings" panose="05000000000000000000" pitchFamily="2" charset="2"/>
-              </a:rPr>
-              <a:t> </a:t>
-            </a:r>
-            <a:r>
-              <a:rPr kumimoji="0" lang="de-DE" sz="4000" b="0" i="0" u="none" strike="noStrike" kern="1200" cap="none" spc="0" normalizeH="0" baseline="0" noProof="0" dirty="0" err="1">
-                <a:ln>
-                  <a:noFill/>
-                </a:ln>
-                <a:solidFill>
-                  <a:prstClr val="black"/>
-                </a:solidFill>
-                <a:effectLst/>
-                <a:uLnTx/>
-                <a:uFillTx/>
-                <a:latin typeface="Calibri"/>
-                <a:ea typeface="+mn-ea"/>
-                <a:cs typeface="+mn-cs"/>
-                <a:sym typeface="Wingdings" panose="05000000000000000000" pitchFamily="2" charset="2"/>
-              </a:rPr>
-              <a:t>beyond</a:t>
-            </a:r>
-            <a:r>
-              <a:rPr kumimoji="0" lang="de-DE" sz="4000" b="0" i="0" u="none" strike="noStrike" kern="1200" cap="none" spc="0" normalizeH="0" baseline="0" noProof="0" dirty="0">
-                <a:ln>
-                  <a:noFill/>
-                </a:ln>
-                <a:solidFill>
-                  <a:prstClr val="black"/>
-                </a:solidFill>
-                <a:effectLst/>
-                <a:uLnTx/>
-                <a:uFillTx/>
-                <a:latin typeface="Calibri"/>
-                <a:ea typeface="+mn-ea"/>
-                <a:cs typeface="+mn-cs"/>
-                <a:sym typeface="Wingdings" panose="05000000000000000000" pitchFamily="2" charset="2"/>
-              </a:rPr>
-              <a:t> </a:t>
-            </a:r>
-            <a:r>
-              <a:rPr kumimoji="0" lang="de-DE" sz="4000" b="0" i="0" u="none" strike="noStrike" kern="1200" cap="none" spc="0" normalizeH="0" baseline="0" noProof="0" dirty="0" err="1">
-                <a:ln>
-                  <a:noFill/>
-                </a:ln>
-                <a:solidFill>
-                  <a:prstClr val="black"/>
-                </a:solidFill>
-                <a:effectLst/>
-                <a:uLnTx/>
-                <a:uFillTx/>
-                <a:latin typeface="Calibri"/>
-                <a:ea typeface="+mn-ea"/>
-                <a:cs typeface="+mn-cs"/>
-                <a:sym typeface="Wingdings" panose="05000000000000000000" pitchFamily="2" charset="2"/>
-              </a:rPr>
-              <a:t>the</a:t>
-            </a:r>
-            <a:r>
-              <a:rPr kumimoji="0" lang="de-DE" sz="4000" b="0" i="0" u="none" strike="noStrike" kern="1200" cap="none" spc="0" normalizeH="0" baseline="0" noProof="0" dirty="0">
-                <a:ln>
-                  <a:noFill/>
-                </a:ln>
-                <a:solidFill>
-                  <a:prstClr val="black"/>
-                </a:solidFill>
-                <a:effectLst/>
-                <a:uLnTx/>
-                <a:uFillTx/>
-                <a:latin typeface="Calibri"/>
-                <a:ea typeface="+mn-ea"/>
-                <a:cs typeface="+mn-cs"/>
-                <a:sym typeface="Wingdings" panose="05000000000000000000" pitchFamily="2" charset="2"/>
-              </a:rPr>
-              <a:t> </a:t>
-            </a:r>
-            <a:r>
-              <a:rPr kumimoji="0" lang="de-DE" sz="4000" b="0" i="0" u="none" strike="noStrike" kern="1200" cap="none" spc="0" normalizeH="0" baseline="0" noProof="0" dirty="0" err="1">
-                <a:ln>
-                  <a:noFill/>
-                </a:ln>
-                <a:solidFill>
-                  <a:prstClr val="black"/>
-                </a:solidFill>
-                <a:effectLst/>
-                <a:uLnTx/>
-                <a:uFillTx/>
-                <a:latin typeface="Calibri"/>
-                <a:ea typeface="+mn-ea"/>
-                <a:cs typeface="+mn-cs"/>
-                <a:sym typeface="Wingdings" panose="05000000000000000000" pitchFamily="2" charset="2"/>
-              </a:rPr>
-              <a:t>data</a:t>
-            </a:r>
-            <a:r>
-              <a:rPr kumimoji="0" lang="de-DE" sz="4000" b="0" i="0" u="none" strike="noStrike" kern="1200" cap="none" spc="0" normalizeH="0" baseline="0" noProof="0" dirty="0">
-                <a:ln>
-                  <a:noFill/>
-                </a:ln>
-                <a:solidFill>
-                  <a:prstClr val="black"/>
-                </a:solidFill>
-                <a:effectLst/>
-                <a:uLnTx/>
-                <a:uFillTx/>
-                <a:latin typeface="Calibri"/>
-                <a:ea typeface="+mn-ea"/>
-                <a:cs typeface="+mn-cs"/>
-                <a:sym typeface="Wingdings" panose="05000000000000000000" pitchFamily="2" charset="2"/>
-              </a:rPr>
-              <a:t> (3) </a:t>
-            </a:r>
-            <a:endParaRPr lang="de-DE" dirty="0"/>
-          </a:p>
-        </p:txBody>
-      </p:sp>
       <p:grpSp>
         <p:nvGrpSpPr>
           <p:cNvPr id="125" name="Gruppieren 124">
@@ -7911,10 +7593,10 @@
           <p:nvPr/>
         </p:nvPicPr>
         <p:blipFill>
-          <a:blip r:embed="rId35">
+          <a:blip r:embed="rId34">
             <a:extLst>
               <a:ext uri="{96DAC541-7B7A-43D3-8B79-37D633B846F1}">
-                <asvg:svgBlip xmlns:asvg="http://schemas.microsoft.com/office/drawing/2016/SVG/main" r:embed="rId36"/>
+                <asvg:svgBlip xmlns:asvg="http://schemas.microsoft.com/office/drawing/2016/SVG/main" r:embed="rId35"/>
               </a:ext>
             </a:extLst>
           </a:blip>
@@ -7946,7 +7628,7 @@
         </p:nvSpPr>
         <p:spPr>
           <a:xfrm>
-            <a:off x="707652" y="26356334"/>
+            <a:off x="707652" y="26388189"/>
             <a:ext cx="9341359" cy="750009"/>
           </a:xfrm>
           <a:prstGeom prst="roundRect">
@@ -8042,7 +7724,7 @@
         <p:spPr>
           <a:xfrm>
             <a:off x="707652" y="27349847"/>
-            <a:ext cx="9341357" cy="4401205"/>
+            <a:ext cx="9341357" cy="5016758"/>
           </a:xfrm>
           <a:prstGeom prst="rect">
             <a:avLst/>
@@ -8065,7 +7747,7 @@
                 <a:ea typeface="Calibri" panose="020F0502020204030204" pitchFamily="34" charset="0"/>
                 <a:cs typeface="Times New Roman" panose="02020603050405020304" pitchFamily="18" charset="0"/>
               </a:rPr>
-              <a:t>Durchschnittlich wurde die unspezifische Streuung (5c) 3.2-mal (95% CI[2.6, 3.8]) pro Lehrkraft adressiert gefolgt von dem Wertebereich (1.9-mal, 95% CI[1.6, 2.4])</a:t>
+              <a:t>Durchschnittlich wurde die unspezifische Streuung (5c) 3.2-mal (95% CI[2.6, 3.8]) pro Lehrkraft adressiert gefolgt von dem Wertebereich (1.9-mal, 95% CI[1.6, 2.4]).</a:t>
             </a:r>
           </a:p>
           <a:p>
@@ -8079,41 +7761,19 @@
                 <a:ea typeface="Calibri" panose="020F0502020204030204" pitchFamily="34" charset="0"/>
                 <a:cs typeface="Times New Roman" panose="02020603050405020304" pitchFamily="18" charset="0"/>
               </a:rPr>
-              <a:t>Am seltensten wurde die Streuung als Abstand zum Mittelwert genannt (0.1-mal, 95% CI[0.0, 0.2])</a:t>
-            </a:r>
+              <a:t>Am seltensten wurde die Streuung als Abstand zum Mittelwert genannt (0.1-mal, 95% CI[0.0, 0.2]).</a:t>
+            </a:r>
+          </a:p>
+          <a:p>
+            <a:pPr algn="just"/>
+            <a:endParaRPr lang="de-DE" sz="4000" dirty="0">
+              <a:latin typeface="Calibri" panose="020F0502020204030204" pitchFamily="34" charset="0"/>
+              <a:ea typeface="Calibri" panose="020F0502020204030204" pitchFamily="34" charset="0"/>
+              <a:cs typeface="Times New Roman" panose="02020603050405020304" pitchFamily="18" charset="0"/>
+            </a:endParaRPr>
           </a:p>
         </p:txBody>
       </p:sp>
-      <p:pic>
-        <p:nvPicPr>
-          <p:cNvPr id="1048" name="Grafik 1047">
-            <a:extLst>
-              <a:ext uri="{FF2B5EF4-FFF2-40B4-BE49-F238E27FC236}">
-                <a16:creationId xmlns:a16="http://schemas.microsoft.com/office/drawing/2014/main" id="{0C645433-D806-6165-E747-C2639AD34A2E}"/>
-              </a:ext>
-            </a:extLst>
-          </p:cNvPr>
-          <p:cNvPicPr>
-            <a:picLocks noChangeAspect="1"/>
-          </p:cNvPicPr>
-          <p:nvPr/>
-        </p:nvPicPr>
-        <p:blipFill>
-          <a:blip r:embed="rId37"/>
-          <a:stretch>
-            <a:fillRect/>
-          </a:stretch>
-        </p:blipFill>
-        <p:spPr>
-          <a:xfrm>
-            <a:off x="707652" y="32355638"/>
-            <a:ext cx="9345271" cy="5991692"/>
-          </a:xfrm>
-          <a:prstGeom prst="rect">
-            <a:avLst/>
-          </a:prstGeom>
-        </p:spPr>
-      </p:pic>
       <p:sp>
         <p:nvSpPr>
           <p:cNvPr id="1050" name="Abgerundetes Rechteck 1049">
@@ -8128,7 +7788,7 @@
         </p:nvSpPr>
         <p:spPr>
           <a:xfrm>
-            <a:off x="10693349" y="26406195"/>
+            <a:off x="10693349" y="26408631"/>
             <a:ext cx="9182382" cy="750009"/>
           </a:xfrm>
           <a:prstGeom prst="roundRect">
@@ -8211,7 +7871,7 @@
                 <a:ea typeface="Calibri" panose="020F0502020204030204" pitchFamily="34" charset="0"/>
                 <a:cs typeface="Times New Roman" panose="02020603050405020304" pitchFamily="18" charset="0"/>
               </a:rPr>
-              <a:t>Das Testergebnis des </a:t>
+              <a:t>Das Ergebnis des Graph </a:t>
             </a:r>
             <a:r>
               <a:rPr lang="de-DE" sz="4000" dirty="0" err="1">
@@ -8219,7 +7879,7 @@
                 <a:ea typeface="Calibri" panose="020F0502020204030204" pitchFamily="34" charset="0"/>
                 <a:cs typeface="Times New Roman" panose="02020603050405020304" pitchFamily="18" charset="0"/>
               </a:rPr>
-              <a:t>graph</a:t>
+              <a:t>Literacy</a:t>
             </a:r>
             <a:r>
               <a:rPr lang="de-DE" sz="4000" dirty="0">
@@ -8227,7 +7887,7 @@
                 <a:ea typeface="Calibri" panose="020F0502020204030204" pitchFamily="34" charset="0"/>
                 <a:cs typeface="Times New Roman" panose="02020603050405020304" pitchFamily="18" charset="0"/>
               </a:rPr>
-              <a:t> </a:t>
+              <a:t> Tests konnte diese Häufigkeiten mit einem kleinen Effekt prädizieren (</a:t>
             </a:r>
             <a:r>
               <a:rPr lang="de-DE" sz="4000" dirty="0" err="1">
@@ -8235,7 +7895,7 @@
                 <a:ea typeface="Calibri" panose="020F0502020204030204" pitchFamily="34" charset="0"/>
                 <a:cs typeface="Times New Roman" panose="02020603050405020304" pitchFamily="18" charset="0"/>
               </a:rPr>
-              <a:t>literacy</a:t>
+              <a:t>Incidence</a:t>
             </a:r>
             <a:r>
               <a:rPr lang="de-DE" sz="4000" dirty="0">
@@ -8243,7 +7903,7 @@
                 <a:ea typeface="Calibri" panose="020F0502020204030204" pitchFamily="34" charset="0"/>
                 <a:cs typeface="Times New Roman" panose="02020603050405020304" pitchFamily="18" charset="0"/>
               </a:rPr>
-              <a:t> Tests konnte diese Häufigkeiten mit einem kleinen Effekt prädizieren (</a:t>
+              <a:t> Ratio = 1.3) welcher statistisch abgesichert werden konnte (</a:t>
             </a:r>
             <a:r>
               <a:rPr lang="de-DE" sz="4000" dirty="0" err="1">
@@ -8251,7 +7911,7 @@
                 <a:ea typeface="Calibri" panose="020F0502020204030204" pitchFamily="34" charset="0"/>
                 <a:cs typeface="Times New Roman" panose="02020603050405020304" pitchFamily="18" charset="0"/>
               </a:rPr>
-              <a:t>Incidence</a:t>
+              <a:t>Evidence</a:t>
             </a:r>
             <a:r>
               <a:rPr lang="de-DE" sz="4000" dirty="0">
@@ -8259,7 +7919,7 @@
                 <a:ea typeface="Calibri" panose="020F0502020204030204" pitchFamily="34" charset="0"/>
                 <a:cs typeface="Times New Roman" panose="02020603050405020304" pitchFamily="18" charset="0"/>
               </a:rPr>
-              <a:t> Ratio = 1.3) welche statistisch signifikant war (</a:t>
+              <a:t> Ratio ER[</a:t>
             </a:r>
             <a:r>
               <a:rPr lang="de-DE" sz="4000" dirty="0" err="1">
@@ -8267,7 +7927,7 @@
                 <a:ea typeface="Calibri" panose="020F0502020204030204" pitchFamily="34" charset="0"/>
                 <a:cs typeface="Times New Roman" panose="02020603050405020304" pitchFamily="18" charset="0"/>
               </a:rPr>
-              <a:t>Posterior</a:t>
+              <a:t>Incidence</a:t>
             </a:r>
             <a:r>
               <a:rPr lang="de-DE" sz="4000" dirty="0">
@@ -8275,39 +7935,7 @@
                 <a:ea typeface="Calibri" panose="020F0502020204030204" pitchFamily="34" charset="0"/>
                 <a:cs typeface="Times New Roman" panose="02020603050405020304" pitchFamily="18" charset="0"/>
               </a:rPr>
-              <a:t> </a:t>
-            </a:r>
-            <a:r>
-              <a:rPr lang="de-DE" sz="4000" dirty="0" err="1">
-                <a:latin typeface="Calibri" panose="020F0502020204030204" pitchFamily="34" charset="0"/>
-                <a:ea typeface="Calibri" panose="020F0502020204030204" pitchFamily="34" charset="0"/>
-                <a:cs typeface="Times New Roman" panose="02020603050405020304" pitchFamily="18" charset="0"/>
-              </a:rPr>
-              <a:t>Probability</a:t>
-            </a:r>
-            <a:r>
-              <a:rPr lang="de-DE" sz="4000" dirty="0">
-                <a:latin typeface="Calibri" panose="020F0502020204030204" pitchFamily="34" charset="0"/>
-                <a:ea typeface="Calibri" panose="020F0502020204030204" pitchFamily="34" charset="0"/>
-                <a:cs typeface="Times New Roman" panose="02020603050405020304" pitchFamily="18" charset="0"/>
-              </a:rPr>
-              <a:t> P[</a:t>
-            </a:r>
-            <a:r>
-              <a:rPr lang="de-DE" sz="4000" dirty="0" err="1">
-                <a:latin typeface="Calibri" panose="020F0502020204030204" pitchFamily="34" charset="0"/>
-                <a:ea typeface="Calibri" panose="020F0502020204030204" pitchFamily="34" charset="0"/>
-                <a:cs typeface="Times New Roman" panose="02020603050405020304" pitchFamily="18" charset="0"/>
-              </a:rPr>
-              <a:t>Incidence</a:t>
-            </a:r>
-            <a:r>
-              <a:rPr lang="de-DE" sz="4000" dirty="0">
-                <a:latin typeface="Calibri" panose="020F0502020204030204" pitchFamily="34" charset="0"/>
-                <a:ea typeface="Calibri" panose="020F0502020204030204" pitchFamily="34" charset="0"/>
-                <a:cs typeface="Times New Roman" panose="02020603050405020304" pitchFamily="18" charset="0"/>
-              </a:rPr>
-              <a:t> Ratio &gt; 1] = .98)</a:t>
+              <a:t> Ratio &gt; 1] = 54.56).</a:t>
             </a:r>
           </a:p>
         </p:txBody>
@@ -8386,7 +8014,7 @@
           <p:nvPr/>
         </p:nvPicPr>
         <p:blipFill>
-          <a:blip r:embed="rId38"/>
+          <a:blip r:embed="rId36"/>
           <a:stretch>
             <a:fillRect/>
           </a:stretch>
@@ -8487,8 +8115,10 @@
               <a:lumMod val="85000"/>
             </a:schemeClr>
           </a:solidFill>
-          <a:ln>
-            <a:noFill/>
+          <a:ln w="9525">
+            <a:solidFill>
+              <a:schemeClr val="tx1"/>
+            </a:solidFill>
           </a:ln>
         </p:spPr>
         <p:style>
@@ -8656,7 +8286,26 @@
                 <a:ea typeface="Calibri" panose="020F0502020204030204" pitchFamily="34" charset="0"/>
                 <a:cs typeface="Times New Roman" panose="02020603050405020304" pitchFamily="18" charset="0"/>
               </a:rPr>
-              <a:t>Die Streuung schien am einfachsten erkennbar und wurde daher am häufigsten adressiert.</a:t>
+              <a:t>Die </a:t>
+            </a:r>
+            <a:r>
+              <a:rPr lang="de-DE" sz="4000" b="1" i="1" dirty="0">
+                <a:solidFill>
+                  <a:srgbClr val="CDDF3C"/>
+                </a:solidFill>
+                <a:latin typeface="Calibri" panose="020F0502020204030204" pitchFamily="34" charset="0"/>
+                <a:ea typeface="Calibri" panose="020F0502020204030204" pitchFamily="34" charset="0"/>
+                <a:cs typeface="Times New Roman" panose="02020603050405020304" pitchFamily="18" charset="0"/>
+              </a:rPr>
+              <a:t>„unspezifische Streuung“ </a:t>
+            </a:r>
+            <a:r>
+              <a:rPr lang="de-DE" sz="4000" dirty="0">
+                <a:latin typeface="Calibri" panose="020F0502020204030204" pitchFamily="34" charset="0"/>
+                <a:ea typeface="Calibri" panose="020F0502020204030204" pitchFamily="34" charset="0"/>
+                <a:cs typeface="Times New Roman" panose="02020603050405020304" pitchFamily="18" charset="0"/>
+              </a:rPr>
+              <a:t>schien am einfachsten erkennbar und wurde daher am häufigsten adressiert.</a:t>
             </a:r>
           </a:p>
           <a:p>
@@ -8670,7 +8319,64 @@
                 <a:ea typeface="Calibri" panose="020F0502020204030204" pitchFamily="34" charset="0"/>
                 <a:cs typeface="Times New Roman" panose="02020603050405020304" pitchFamily="18" charset="0"/>
               </a:rPr>
-              <a:t>Komplexere statistische Entitäten wie die Streuung als Abstand zum Mittelwert oder Ausreißer wurden überaus selten erkannt</a:t>
+              <a:t>Komplexere statistische Entitäten wie die </a:t>
+            </a:r>
+            <a:r>
+              <a:rPr lang="de-DE" sz="4000" b="1" i="1" dirty="0">
+                <a:solidFill>
+                  <a:srgbClr val="8A8000"/>
+                </a:solidFill>
+                <a:latin typeface="Calibri" panose="020F0502020204030204" pitchFamily="34" charset="0"/>
+                <a:ea typeface="Calibri" panose="020F0502020204030204" pitchFamily="34" charset="0"/>
+                <a:cs typeface="Times New Roman" panose="02020603050405020304" pitchFamily="18" charset="0"/>
+              </a:rPr>
+              <a:t>„Streuung als Abstand zum Mittelwert“</a:t>
+            </a:r>
+            <a:r>
+              <a:rPr lang="de-DE" sz="4000" i="1" dirty="0">
+                <a:latin typeface="Calibri" panose="020F0502020204030204" pitchFamily="34" charset="0"/>
+                <a:ea typeface="Calibri" panose="020F0502020204030204" pitchFamily="34" charset="0"/>
+                <a:cs typeface="Times New Roman" panose="02020603050405020304" pitchFamily="18" charset="0"/>
+              </a:rPr>
+              <a:t> </a:t>
+            </a:r>
+            <a:r>
+              <a:rPr lang="de-DE" sz="4000" dirty="0">
+                <a:latin typeface="Calibri" panose="020F0502020204030204" pitchFamily="34" charset="0"/>
+                <a:ea typeface="Calibri" panose="020F0502020204030204" pitchFamily="34" charset="0"/>
+                <a:cs typeface="Times New Roman" panose="02020603050405020304" pitchFamily="18" charset="0"/>
+              </a:rPr>
+              <a:t>oder </a:t>
+            </a:r>
+            <a:r>
+              <a:rPr lang="de-DE" sz="4000" b="1" i="1" dirty="0">
+                <a:solidFill>
+                  <a:srgbClr val="462268"/>
+                </a:solidFill>
+                <a:latin typeface="Calibri" panose="020F0502020204030204" pitchFamily="34" charset="0"/>
+                <a:ea typeface="Calibri" panose="020F0502020204030204" pitchFamily="34" charset="0"/>
+                <a:cs typeface="Times New Roman" panose="02020603050405020304" pitchFamily="18" charset="0"/>
+              </a:rPr>
+              <a:t>„Ausreißer“</a:t>
+            </a:r>
+            <a:r>
+              <a:rPr lang="de-DE" sz="4000" i="1" dirty="0">
+                <a:solidFill>
+                  <a:srgbClr val="462268"/>
+                </a:solidFill>
+                <a:latin typeface="Calibri" panose="020F0502020204030204" pitchFamily="34" charset="0"/>
+                <a:ea typeface="Calibri" panose="020F0502020204030204" pitchFamily="34" charset="0"/>
+                <a:cs typeface="Times New Roman" panose="02020603050405020304" pitchFamily="18" charset="0"/>
+              </a:rPr>
+              <a:t> </a:t>
+            </a:r>
+            <a:r>
+              <a:rPr lang="de-DE" sz="4000" dirty="0">
+                <a:latin typeface="Calibri" panose="020F0502020204030204" pitchFamily="34" charset="0"/>
+                <a:ea typeface="Calibri" panose="020F0502020204030204" pitchFamily="34" charset="0"/>
+                <a:cs typeface="Times New Roman" panose="02020603050405020304" pitchFamily="18" charset="0"/>
+              </a:rPr>
+              <a:t>wurden überaus selten erkannt.</a:t>
             </a:r>
           </a:p>
           <a:p>
@@ -8684,7 +8390,7 @@
                 <a:ea typeface="Calibri" panose="020F0502020204030204" pitchFamily="34" charset="0"/>
                 <a:cs typeface="Times New Roman" panose="02020603050405020304" pitchFamily="18" charset="0"/>
               </a:rPr>
-              <a:t>Nur kleiner Effekt bei Assoziation zwischen Kurztest und Häufigkeiten </a:t>
+              <a:t>Nur kleiner Effekt bei Assoziation zwischen Kurztest und Häufigkeiten. </a:t>
             </a:r>
           </a:p>
           <a:p>
@@ -8770,10 +8476,10 @@
           <p:nvPr/>
         </p:nvPicPr>
         <p:blipFill>
-          <a:blip r:embed="rId39">
+          <a:blip r:embed="rId37">
             <a:extLst>
               <a:ext uri="{96DAC541-7B7A-43D3-8B79-37D633B846F1}">
-                <asvg:svgBlip xmlns:asvg="http://schemas.microsoft.com/office/drawing/2016/SVG/main" r:embed="rId40"/>
+                <asvg:svgBlip xmlns:asvg="http://schemas.microsoft.com/office/drawing/2016/SVG/main" r:embed="rId38"/>
               </a:ext>
             </a:extLst>
           </a:blip>
@@ -8805,8 +8511,8 @@
         </p:nvSpPr>
         <p:spPr>
           <a:xfrm>
-            <a:off x="1578519" y="38324409"/>
-            <a:ext cx="7555062" cy="517257"/>
+            <a:off x="685799" y="41674235"/>
+            <a:ext cx="9191901" cy="897362"/>
           </a:xfrm>
           <a:prstGeom prst="rect">
             <a:avLst/>
@@ -8828,13 +8534,39 @@
               </a:spcAft>
             </a:pPr>
             <a:r>
-              <a:rPr lang="de-DE" sz="2700" kern="100" dirty="0">
+              <a:rPr lang="de-DE" sz="2500" u="sng" kern="100" dirty="0">
                 <a:effectLst/>
                 <a:latin typeface="Calibri" panose="020F0502020204030204" pitchFamily="34" charset="0"/>
                 <a:ea typeface="Calibri" panose="020F0502020204030204" pitchFamily="34" charset="0"/>
                 <a:cs typeface="Times New Roman" panose="02020603050405020304" pitchFamily="18" charset="0"/>
               </a:rPr>
-              <a:t>Abbildung 1: Durchschnittliche Adressierung der SE </a:t>
+              <a:t>Abbildung 1</a:t>
+            </a:r>
+            <a:r>
+              <a:rPr lang="de-DE" sz="2500" kern="100" dirty="0">
+                <a:effectLst/>
+                <a:latin typeface="Calibri" panose="020F0502020204030204" pitchFamily="34" charset="0"/>
+                <a:ea typeface="Calibri" panose="020F0502020204030204" pitchFamily="34" charset="0"/>
+                <a:cs typeface="Times New Roman" panose="02020603050405020304" pitchFamily="18" charset="0"/>
+              </a:rPr>
+              <a:t>: </a:t>
+            </a:r>
+            <a:r>
+              <a:rPr lang="de-DE" sz="2500" kern="100" dirty="0">
+                <a:latin typeface="Calibri" panose="020F0502020204030204" pitchFamily="34" charset="0"/>
+                <a:ea typeface="Calibri" panose="020F0502020204030204" pitchFamily="34" charset="0"/>
+                <a:cs typeface="Times New Roman" panose="02020603050405020304" pitchFamily="18" charset="0"/>
+              </a:rPr>
+              <a:t>Geschätzte d</a:t>
+            </a:r>
+            <a:r>
+              <a:rPr lang="de-DE" sz="2500" kern="100" dirty="0">
+                <a:effectLst/>
+                <a:latin typeface="Calibri" panose="020F0502020204030204" pitchFamily="34" charset="0"/>
+                <a:ea typeface="Calibri" panose="020F0502020204030204" pitchFamily="34" charset="0"/>
+                <a:cs typeface="Times New Roman" panose="02020603050405020304" pitchFamily="18" charset="0"/>
+              </a:rPr>
+              <a:t>urchschnittliche Adressierung der statistischen Entitäten</a:t>
             </a:r>
           </a:p>
         </p:txBody>
@@ -8853,8 +8585,8 @@
         </p:nvSpPr>
         <p:spPr>
           <a:xfrm>
-            <a:off x="10466417" y="38041440"/>
-            <a:ext cx="9872884" cy="517257"/>
+            <a:off x="10693349" y="38026499"/>
+            <a:ext cx="9376355" cy="485710"/>
           </a:xfrm>
           <a:prstGeom prst="rect">
             <a:avLst/>
@@ -8876,43 +8608,59 @@
               </a:spcAft>
             </a:pPr>
             <a:r>
-              <a:rPr lang="de-DE" sz="2700" kern="100" dirty="0">
+              <a:rPr lang="de-DE" sz="2500" u="sng" kern="100" dirty="0">
                 <a:effectLst/>
                 <a:latin typeface="Calibri" panose="020F0502020204030204" pitchFamily="34" charset="0"/>
                 <a:ea typeface="Calibri" panose="020F0502020204030204" pitchFamily="34" charset="0"/>
                 <a:cs typeface="Times New Roman" panose="02020603050405020304" pitchFamily="18" charset="0"/>
               </a:rPr>
-              <a:t>Abbildung 2: Proportion der </a:t>
-            </a:r>
-            <a:r>
-              <a:rPr lang="de-DE" sz="2700" kern="100" dirty="0" err="1">
+              <a:t>Abbildung 2</a:t>
+            </a:r>
+            <a:r>
+              <a:rPr lang="de-DE" sz="2500" kern="100" dirty="0">
                 <a:effectLst/>
                 <a:latin typeface="Calibri" panose="020F0502020204030204" pitchFamily="34" charset="0"/>
                 <a:ea typeface="Calibri" panose="020F0502020204030204" pitchFamily="34" charset="0"/>
                 <a:cs typeface="Times New Roman" panose="02020603050405020304" pitchFamily="18" charset="0"/>
               </a:rPr>
-              <a:t>graph</a:t>
-            </a:r>
-            <a:r>
-              <a:rPr lang="de-DE" sz="2700" kern="100" dirty="0">
+              <a:t>: Proportion der </a:t>
+            </a:r>
+            <a:r>
+              <a:rPr lang="de-DE" sz="2500" kern="100" dirty="0">
+                <a:latin typeface="Calibri" panose="020F0502020204030204" pitchFamily="34" charset="0"/>
+                <a:ea typeface="Calibri" panose="020F0502020204030204" pitchFamily="34" charset="0"/>
+                <a:cs typeface="Times New Roman" panose="02020603050405020304" pitchFamily="18" charset="0"/>
+              </a:rPr>
+              <a:t>G</a:t>
+            </a:r>
+            <a:r>
+              <a:rPr lang="de-DE" sz="2500" kern="100" dirty="0">
                 <a:effectLst/>
                 <a:latin typeface="Calibri" panose="020F0502020204030204" pitchFamily="34" charset="0"/>
                 <a:ea typeface="Calibri" panose="020F0502020204030204" pitchFamily="34" charset="0"/>
                 <a:cs typeface="Times New Roman" panose="02020603050405020304" pitchFamily="18" charset="0"/>
               </a:rPr>
-              <a:t> </a:t>
-            </a:r>
-            <a:r>
-              <a:rPr lang="de-DE" sz="2700" kern="100" dirty="0" err="1">
+              <a:t>raph </a:t>
+            </a:r>
+            <a:r>
+              <a:rPr lang="de-DE" sz="2500" kern="100" dirty="0" err="1">
+                <a:latin typeface="Calibri" panose="020F0502020204030204" pitchFamily="34" charset="0"/>
+                <a:ea typeface="Calibri" panose="020F0502020204030204" pitchFamily="34" charset="0"/>
+                <a:cs typeface="Times New Roman" panose="02020603050405020304" pitchFamily="18" charset="0"/>
+              </a:rPr>
+              <a:t>L</a:t>
+            </a:r>
+            <a:r>
+              <a:rPr lang="de-DE" sz="2500" kern="100" dirty="0" err="1">
                 <a:effectLst/>
                 <a:latin typeface="Calibri" panose="020F0502020204030204" pitchFamily="34" charset="0"/>
                 <a:ea typeface="Calibri" panose="020F0502020204030204" pitchFamily="34" charset="0"/>
                 <a:cs typeface="Times New Roman" panose="02020603050405020304" pitchFamily="18" charset="0"/>
               </a:rPr>
-              <a:t>literacy</a:t>
-            </a:r>
-            <a:r>
-              <a:rPr lang="de-DE" sz="2700" kern="100" dirty="0">
+              <a:t>iteracy</a:t>
+            </a:r>
+            <a:r>
+              <a:rPr lang="de-DE" sz="2500" kern="100" dirty="0">
                 <a:effectLst/>
                 <a:latin typeface="Calibri" panose="020F0502020204030204" pitchFamily="34" charset="0"/>
                 <a:ea typeface="Calibri" panose="020F0502020204030204" pitchFamily="34" charset="0"/>
@@ -8921,32 +8669,31 @@
               <a:t> </a:t>
             </a:r>
             <a:r>
-              <a:rPr lang="de-DE" sz="2700" kern="100" dirty="0" err="1">
+              <a:rPr lang="de-DE" sz="2500" kern="100" dirty="0">
+                <a:latin typeface="Calibri" panose="020F0502020204030204" pitchFamily="34" charset="0"/>
+                <a:ea typeface="Calibri" panose="020F0502020204030204" pitchFamily="34" charset="0"/>
+                <a:cs typeface="Times New Roman" panose="02020603050405020304" pitchFamily="18" charset="0"/>
+              </a:rPr>
+              <a:t>L</a:t>
+            </a:r>
+            <a:r>
+              <a:rPr lang="de-DE" sz="2500" kern="100" dirty="0">
                 <a:effectLst/>
                 <a:latin typeface="Calibri" panose="020F0502020204030204" pitchFamily="34" charset="0"/>
                 <a:ea typeface="Calibri" panose="020F0502020204030204" pitchFamily="34" charset="0"/>
                 <a:cs typeface="Times New Roman" panose="02020603050405020304" pitchFamily="18" charset="0"/>
               </a:rPr>
-              <a:t>level</a:t>
-            </a:r>
-            <a:r>
-              <a:rPr lang="de-DE" sz="2700" kern="100" dirty="0">
-                <a:effectLst/>
+              <a:t>evel an der </a:t>
+            </a:r>
+            <a:r>
+              <a:rPr lang="de-DE" sz="2500" kern="100" dirty="0">
                 <a:latin typeface="Calibri" panose="020F0502020204030204" pitchFamily="34" charset="0"/>
                 <a:ea typeface="Calibri" panose="020F0502020204030204" pitchFamily="34" charset="0"/>
                 <a:cs typeface="Times New Roman" panose="02020603050405020304" pitchFamily="18" charset="0"/>
               </a:rPr>
-              <a:t> an der </a:t>
-            </a:r>
-            <a:r>
-              <a:rPr lang="de-DE" sz="2700" kern="100" dirty="0">
-                <a:latin typeface="Calibri" panose="020F0502020204030204" pitchFamily="34" charset="0"/>
-                <a:ea typeface="Calibri" panose="020F0502020204030204" pitchFamily="34" charset="0"/>
-                <a:cs typeface="Times New Roman" panose="02020603050405020304" pitchFamily="18" charset="0"/>
-              </a:rPr>
               <a:t>Gesamtdauer </a:t>
             </a:r>
-            <a:endParaRPr lang="de-DE" sz="2700" kern="100" dirty="0">
+            <a:endParaRPr lang="de-DE" sz="2500" kern="100" dirty="0">
               <a:effectLst/>
               <a:latin typeface="Calibri" panose="020F0502020204030204" pitchFamily="34" charset="0"/>
               <a:ea typeface="Calibri" panose="020F0502020204030204" pitchFamily="34" charset="0"/>
@@ -8970,10 +8717,10 @@
           <p:nvPr/>
         </p:nvPicPr>
         <p:blipFill>
-          <a:blip r:embed="rId41">
+          <a:blip r:embed="rId39">
             <a:extLst>
               <a:ext uri="{96DAC541-7B7A-43D3-8B79-37D633B846F1}">
-                <asvg:svgBlip xmlns:asvg="http://schemas.microsoft.com/office/drawing/2016/SVG/main" r:embed="rId42"/>
+                <asvg:svgBlip xmlns:asvg="http://schemas.microsoft.com/office/drawing/2016/SVG/main" r:embed="rId40"/>
               </a:ext>
             </a:extLst>
           </a:blip>
@@ -8983,14 +8730,1305 @@
         </p:blipFill>
         <p:spPr>
           <a:xfrm>
-            <a:off x="20470991" y="36021656"/>
-            <a:ext cx="437941" cy="437941"/>
+            <a:off x="20430615" y="35974601"/>
+            <a:ext cx="506218" cy="506218"/>
           </a:xfrm>
           <a:prstGeom prst="rect">
             <a:avLst/>
           </a:prstGeom>
         </p:spPr>
       </p:pic>
+      <p:pic>
+        <p:nvPicPr>
+          <p:cNvPr id="16" name="Grafik 15" descr="Marke 7 mit einfarbiger Füllung">
+            <a:extLst>
+              <a:ext uri="{FF2B5EF4-FFF2-40B4-BE49-F238E27FC236}">
+                <a16:creationId xmlns:a16="http://schemas.microsoft.com/office/drawing/2014/main" id="{16D9105C-7F9B-A003-9DE9-6FF41C319997}"/>
+              </a:ext>
+            </a:extLst>
+          </p:cNvPr>
+          <p:cNvPicPr>
+            <a:picLocks noChangeAspect="1"/>
+          </p:cNvPicPr>
+          <p:nvPr/>
+        </p:nvPicPr>
+        <p:blipFill>
+          <a:blip r:embed="rId19">
+            <a:extLst>
+              <a:ext uri="{96DAC541-7B7A-43D3-8B79-37D633B846F1}">
+                <asvg:svgBlip xmlns:asvg="http://schemas.microsoft.com/office/drawing/2016/SVG/main" r:embed="rId20"/>
+              </a:ext>
+            </a:extLst>
+          </a:blip>
+          <a:stretch>
+            <a:fillRect/>
+          </a:stretch>
+        </p:blipFill>
+        <p:spPr>
+          <a:xfrm>
+            <a:off x="12388272" y="21706964"/>
+            <a:ext cx="579982" cy="552413"/>
+          </a:xfrm>
+          <a:prstGeom prst="rect">
+            <a:avLst/>
+          </a:prstGeom>
+        </p:spPr>
+      </p:pic>
+      <p:grpSp>
+        <p:nvGrpSpPr>
+          <p:cNvPr id="28" name="Gruppieren 27">
+            <a:extLst>
+              <a:ext uri="{FF2B5EF4-FFF2-40B4-BE49-F238E27FC236}">
+                <a16:creationId xmlns:a16="http://schemas.microsoft.com/office/drawing/2014/main" id="{CC125A82-BAD1-BE19-7327-34907D0B5F70}"/>
+              </a:ext>
+            </a:extLst>
+          </p:cNvPr>
+          <p:cNvGrpSpPr/>
+          <p:nvPr/>
+        </p:nvGrpSpPr>
+        <p:grpSpPr>
+          <a:xfrm>
+            <a:off x="8593953" y="19773911"/>
+            <a:ext cx="12485687" cy="2554545"/>
+            <a:chOff x="8593953" y="19773911"/>
+            <a:chExt cx="12485687" cy="2554545"/>
+          </a:xfrm>
+        </p:grpSpPr>
+        <p:sp>
+          <p:nvSpPr>
+            <p:cNvPr id="86" name="Textfeld 85">
+              <a:extLst>
+                <a:ext uri="{FF2B5EF4-FFF2-40B4-BE49-F238E27FC236}">
+                  <a16:creationId xmlns:a16="http://schemas.microsoft.com/office/drawing/2014/main" id="{BD0E819C-1CAB-317D-5258-B26AA19176C0}"/>
+                </a:ext>
+              </a:extLst>
+            </p:cNvPr>
+            <p:cNvSpPr txBox="1"/>
+            <p:nvPr/>
+          </p:nvSpPr>
+          <p:spPr>
+            <a:xfrm>
+              <a:off x="8593953" y="19773911"/>
+              <a:ext cx="12485687" cy="2554545"/>
+            </a:xfrm>
+            <a:prstGeom prst="rect">
+              <a:avLst/>
+            </a:prstGeom>
+            <a:noFill/>
+          </p:spPr>
+          <p:txBody>
+            <a:bodyPr wrap="square">
+              <a:spAutoFit/>
+            </a:bodyPr>
+            <a:lstStyle/>
+            <a:p>
+              <a:r>
+                <a:rPr kumimoji="0" lang="de-DE" sz="4000" b="1" i="0" u="sng" strike="noStrike" kern="1200" cap="none" spc="0" normalizeH="0" baseline="0" noProof="0" dirty="0">
+                  <a:ln>
+                    <a:noFill/>
+                  </a:ln>
+                  <a:solidFill>
+                    <a:prstClr val="black"/>
+                  </a:solidFill>
+                  <a:effectLst/>
+                  <a:uLnTx/>
+                  <a:uFillTx/>
+                  <a:latin typeface="Calibri"/>
+                  <a:ea typeface="+mn-ea"/>
+                  <a:cs typeface="+mn-cs"/>
+                  <a:sym typeface="Wingdings" panose="05000000000000000000" pitchFamily="2" charset="2"/>
+                </a:rPr>
+                <a:t>Statistische Entitäten</a:t>
+              </a:r>
+              <a:r>
+                <a:rPr kumimoji="0" lang="de-DE" sz="4000" i="0" strike="noStrike" kern="1200" cap="none" spc="0" normalizeH="0" baseline="0" noProof="0" dirty="0">
+                  <a:ln>
+                    <a:noFill/>
+                  </a:ln>
+                  <a:solidFill>
+                    <a:prstClr val="black"/>
+                  </a:solidFill>
+                  <a:effectLst/>
+                  <a:uLnTx/>
+                  <a:uFillTx/>
+                  <a:latin typeface="Calibri"/>
+                  <a:ea typeface="+mn-ea"/>
+                  <a:cs typeface="+mn-cs"/>
+                  <a:sym typeface="Wingdings" panose="05000000000000000000" pitchFamily="2" charset="2"/>
+                </a:rPr>
+                <a:t>:</a:t>
+              </a:r>
+              <a:r>
+                <a:rPr kumimoji="0" lang="de-DE" sz="4000" b="0" i="0" u="none" strike="noStrike" kern="1200" cap="none" spc="0" normalizeH="0" baseline="0" noProof="0" dirty="0">
+                  <a:ln>
+                    <a:noFill/>
+                  </a:ln>
+                  <a:solidFill>
+                    <a:prstClr val="black"/>
+                  </a:solidFill>
+                  <a:effectLst/>
+                  <a:uLnTx/>
+                  <a:uFillTx/>
+                  <a:latin typeface="Calibri"/>
+                  <a:ea typeface="+mn-ea"/>
+                  <a:cs typeface="+mn-cs"/>
+                  <a:sym typeface="Wingdings" panose="05000000000000000000" pitchFamily="2" charset="2"/>
+                </a:rPr>
+                <a:t> Ausreißer     , </a:t>
+              </a:r>
+              <a:r>
+                <a:rPr kumimoji="0" lang="de-DE" sz="4000" b="0" i="0" u="none" strike="noStrike" kern="1200" cap="none" spc="0" normalizeH="0" baseline="0" noProof="0" dirty="0" err="1">
+                  <a:ln>
+                    <a:noFill/>
+                  </a:ln>
+                  <a:solidFill>
+                    <a:prstClr val="black"/>
+                  </a:solidFill>
+                  <a:effectLst/>
+                  <a:uLnTx/>
+                  <a:uFillTx/>
+                  <a:latin typeface="Calibri"/>
+                  <a:ea typeface="+mn-ea"/>
+                  <a:cs typeface="+mn-cs"/>
+                  <a:sym typeface="Wingdings" panose="05000000000000000000" pitchFamily="2" charset="2"/>
+                </a:rPr>
+                <a:t>Bimodalität</a:t>
+              </a:r>
+              <a:r>
+                <a:rPr kumimoji="0" lang="de-DE" sz="4000" b="0" i="0" u="none" strike="noStrike" kern="1200" cap="none" spc="0" normalizeH="0" baseline="0" noProof="0" dirty="0">
+                  <a:ln>
+                    <a:noFill/>
+                  </a:ln>
+                  <a:solidFill>
+                    <a:prstClr val="black"/>
+                  </a:solidFill>
+                  <a:effectLst/>
+                  <a:uLnTx/>
+                  <a:uFillTx/>
+                  <a:latin typeface="Calibri"/>
+                  <a:ea typeface="+mn-ea"/>
+                  <a:cs typeface="+mn-cs"/>
+                  <a:sym typeface="Wingdings" panose="05000000000000000000" pitchFamily="2" charset="2"/>
+                </a:rPr>
+                <a:t>    , </a:t>
+              </a:r>
+            </a:p>
+            <a:p>
+              <a:r>
+                <a:rPr kumimoji="0" lang="de-DE" sz="4000" b="0" i="0" u="none" strike="noStrike" kern="1200" cap="none" spc="0" normalizeH="0" baseline="0" noProof="0" dirty="0">
+                  <a:ln>
+                    <a:noFill/>
+                  </a:ln>
+                  <a:solidFill>
+                    <a:prstClr val="black"/>
+                  </a:solidFill>
+                  <a:effectLst/>
+                  <a:uLnTx/>
+                  <a:uFillTx/>
+                  <a:latin typeface="Calibri"/>
+                  <a:ea typeface="+mn-ea"/>
+                  <a:cs typeface="+mn-cs"/>
+                  <a:sym typeface="Wingdings" panose="05000000000000000000" pitchFamily="2" charset="2"/>
+                </a:rPr>
+                <a:t>Schiefe     , Mittelwertdifferenz     , Streuung als Wertebereich     , als Abstand zum Mittelwert </a:t>
+              </a:r>
+              <a:r>
+                <a:rPr lang="de-DE" sz="4000" dirty="0">
+                  <a:solidFill>
+                    <a:prstClr val="black"/>
+                  </a:solidFill>
+                  <a:latin typeface="Calibri"/>
+                  <a:sym typeface="Wingdings" panose="05000000000000000000" pitchFamily="2" charset="2"/>
+                </a:rPr>
+                <a:t>    </a:t>
+              </a:r>
+            </a:p>
+            <a:p>
+              <a:r>
+                <a:rPr kumimoji="0" lang="de-DE" sz="4000" b="0" i="0" u="none" strike="noStrike" kern="1200" cap="none" spc="0" normalizeH="0" baseline="0" noProof="0" dirty="0">
+                  <a:ln>
+                    <a:noFill/>
+                  </a:ln>
+                  <a:solidFill>
+                    <a:prstClr val="black"/>
+                  </a:solidFill>
+                  <a:effectLst/>
+                  <a:uLnTx/>
+                  <a:uFillTx/>
+                  <a:latin typeface="Calibri"/>
+                  <a:ea typeface="+mn-ea"/>
+                  <a:cs typeface="+mn-cs"/>
+                  <a:sym typeface="Wingdings" panose="05000000000000000000" pitchFamily="2" charset="2"/>
+                </a:rPr>
+                <a:t>und unspezifiziert</a:t>
+              </a:r>
+              <a:endParaRPr lang="de-DE" dirty="0"/>
+            </a:p>
+          </p:txBody>
+        </p:sp>
+        <p:pic>
+          <p:nvPicPr>
+            <p:cNvPr id="9" name="Grafik 8" descr="Marke 4 mit einfarbiger Füllung">
+              <a:extLst>
+                <a:ext uri="{FF2B5EF4-FFF2-40B4-BE49-F238E27FC236}">
+                  <a16:creationId xmlns:a16="http://schemas.microsoft.com/office/drawing/2014/main" id="{8DEF77C9-C390-220E-36FC-52DCD0167FD5}"/>
+                </a:ext>
+              </a:extLst>
+            </p:cNvPr>
+            <p:cNvPicPr>
+              <a:picLocks noChangeAspect="1"/>
+            </p:cNvPicPr>
+            <p:nvPr/>
+          </p:nvPicPr>
+          <p:blipFill>
+            <a:blip r:embed="rId9">
+              <a:extLst>
+                <a:ext uri="{96DAC541-7B7A-43D3-8B79-37D633B846F1}">
+                  <asvg:svgBlip xmlns:asvg="http://schemas.microsoft.com/office/drawing/2016/SVG/main" r:embed="rId10"/>
+                </a:ext>
+              </a:extLst>
+            </a:blip>
+            <a:stretch>
+              <a:fillRect/>
+            </a:stretch>
+          </p:blipFill>
+          <p:spPr>
+            <a:xfrm>
+              <a:off x="15032243" y="20492719"/>
+              <a:ext cx="579982" cy="552413"/>
+            </a:xfrm>
+            <a:prstGeom prst="rect">
+              <a:avLst/>
+            </a:prstGeom>
+          </p:spPr>
+        </p:pic>
+        <p:pic>
+          <p:nvPicPr>
+            <p:cNvPr id="11" name="Grafik 10" descr="Marke 6 mit einfarbiger Füllung">
+              <a:extLst>
+                <a:ext uri="{FF2B5EF4-FFF2-40B4-BE49-F238E27FC236}">
+                  <a16:creationId xmlns:a16="http://schemas.microsoft.com/office/drawing/2014/main" id="{0DB61A62-BA1A-61DA-92D7-90821C78D27A}"/>
+                </a:ext>
+              </a:extLst>
+            </p:cNvPr>
+            <p:cNvPicPr>
+              <a:picLocks noChangeAspect="1"/>
+            </p:cNvPicPr>
+            <p:nvPr/>
+          </p:nvPicPr>
+          <p:blipFill>
+            <a:blip r:embed="rId11">
+              <a:extLst>
+                <a:ext uri="{96DAC541-7B7A-43D3-8B79-37D633B846F1}">
+                  <asvg:svgBlip xmlns:asvg="http://schemas.microsoft.com/office/drawing/2016/SVG/main" r:embed="rId12"/>
+                </a:ext>
+              </a:extLst>
+            </a:blip>
+            <a:stretch>
+              <a:fillRect/>
+            </a:stretch>
+          </p:blipFill>
+          <p:spPr>
+            <a:xfrm>
+              <a:off x="17991502" y="21039140"/>
+              <a:ext cx="579982" cy="552413"/>
+            </a:xfrm>
+            <a:prstGeom prst="rect">
+              <a:avLst/>
+            </a:prstGeom>
+          </p:spPr>
+        </p:pic>
+        <p:pic>
+          <p:nvPicPr>
+            <p:cNvPr id="13" name="Grafik 12" descr="Abzeichen mit einfarbiger Füllung">
+              <a:extLst>
+                <a:ext uri="{FF2B5EF4-FFF2-40B4-BE49-F238E27FC236}">
+                  <a16:creationId xmlns:a16="http://schemas.microsoft.com/office/drawing/2014/main" id="{B962C0E1-8080-6BC9-4636-E6367A1352AC}"/>
+                </a:ext>
+              </a:extLst>
+            </p:cNvPr>
+            <p:cNvPicPr>
+              <a:picLocks noChangeAspect="1"/>
+            </p:cNvPicPr>
+            <p:nvPr/>
+          </p:nvPicPr>
+          <p:blipFill>
+            <a:blip r:embed="rId13">
+              <a:extLst>
+                <a:ext uri="{96DAC541-7B7A-43D3-8B79-37D633B846F1}">
+                  <asvg:svgBlip xmlns:asvg="http://schemas.microsoft.com/office/drawing/2016/SVG/main" r:embed="rId14"/>
+                </a:ext>
+              </a:extLst>
+            </a:blip>
+            <a:stretch>
+              <a:fillRect/>
+            </a:stretch>
+          </p:blipFill>
+          <p:spPr>
+            <a:xfrm>
+              <a:off x="18571559" y="19851766"/>
+              <a:ext cx="579982" cy="552413"/>
+            </a:xfrm>
+            <a:prstGeom prst="rect">
+              <a:avLst/>
+            </a:prstGeom>
+          </p:spPr>
+        </p:pic>
+        <p:pic>
+          <p:nvPicPr>
+            <p:cNvPr id="14" name="Grafik 13" descr="Marke 3 mit einfarbiger Füllung">
+              <a:extLst>
+                <a:ext uri="{FF2B5EF4-FFF2-40B4-BE49-F238E27FC236}">
+                  <a16:creationId xmlns:a16="http://schemas.microsoft.com/office/drawing/2014/main" id="{A3ADEEBA-18F4-04CD-A99D-EC7BBBA913DB}"/>
+                </a:ext>
+              </a:extLst>
+            </p:cNvPr>
+            <p:cNvPicPr>
+              <a:picLocks noChangeAspect="1"/>
+            </p:cNvPicPr>
+            <p:nvPr/>
+          </p:nvPicPr>
+          <p:blipFill>
+            <a:blip r:embed="rId15">
+              <a:extLst>
+                <a:ext uri="{96DAC541-7B7A-43D3-8B79-37D633B846F1}">
+                  <asvg:svgBlip xmlns:asvg="http://schemas.microsoft.com/office/drawing/2016/SVG/main" r:embed="rId16"/>
+                </a:ext>
+              </a:extLst>
+            </a:blip>
+            <a:stretch>
+              <a:fillRect/>
+            </a:stretch>
+          </p:blipFill>
+          <p:spPr>
+            <a:xfrm>
+              <a:off x="10176426" y="20457173"/>
+              <a:ext cx="579982" cy="552413"/>
+            </a:xfrm>
+            <a:prstGeom prst="rect">
+              <a:avLst/>
+            </a:prstGeom>
+          </p:spPr>
+        </p:pic>
+        <p:pic>
+          <p:nvPicPr>
+            <p:cNvPr id="15" name="Grafik 14" descr="Marke 1 mit einfarbiger Füllung">
+              <a:extLst>
+                <a:ext uri="{FF2B5EF4-FFF2-40B4-BE49-F238E27FC236}">
+                  <a16:creationId xmlns:a16="http://schemas.microsoft.com/office/drawing/2014/main" id="{DFA887A2-7142-3477-D816-B320DC2C2029}"/>
+                </a:ext>
+              </a:extLst>
+            </p:cNvPr>
+            <p:cNvPicPr>
+              <a:picLocks noChangeAspect="1"/>
+            </p:cNvPicPr>
+            <p:nvPr/>
+          </p:nvPicPr>
+          <p:blipFill>
+            <a:blip r:embed="rId17">
+              <a:extLst>
+                <a:ext uri="{96DAC541-7B7A-43D3-8B79-37D633B846F1}">
+                  <asvg:svgBlip xmlns:asvg="http://schemas.microsoft.com/office/drawing/2016/SVG/main" r:embed="rId18"/>
+                </a:ext>
+              </a:extLst>
+            </a:blip>
+            <a:stretch>
+              <a:fillRect/>
+            </a:stretch>
+          </p:blipFill>
+          <p:spPr>
+            <a:xfrm>
+              <a:off x="15419243" y="19847368"/>
+              <a:ext cx="579982" cy="552413"/>
+            </a:xfrm>
+            <a:prstGeom prst="rect">
+              <a:avLst/>
+            </a:prstGeom>
+          </p:spPr>
+        </p:pic>
+        <p:pic>
+          <p:nvPicPr>
+            <p:cNvPr id="17" name="Grafik 16" descr="Marke 5 mit einfarbiger Füllung">
+              <a:extLst>
+                <a:ext uri="{FF2B5EF4-FFF2-40B4-BE49-F238E27FC236}">
+                  <a16:creationId xmlns:a16="http://schemas.microsoft.com/office/drawing/2014/main" id="{2A56FCB5-9F2E-A454-BFC2-DD4AE6751DC8}"/>
+                </a:ext>
+              </a:extLst>
+            </p:cNvPr>
+            <p:cNvPicPr>
+              <a:picLocks noChangeAspect="1"/>
+            </p:cNvPicPr>
+            <p:nvPr/>
+          </p:nvPicPr>
+          <p:blipFill>
+            <a:blip r:embed="rId21">
+              <a:extLst>
+                <a:ext uri="{96DAC541-7B7A-43D3-8B79-37D633B846F1}">
+                  <asvg:svgBlip xmlns:asvg="http://schemas.microsoft.com/office/drawing/2016/SVG/main" r:embed="rId22"/>
+                </a:ext>
+              </a:extLst>
+            </a:blip>
+            <a:stretch>
+              <a:fillRect/>
+            </a:stretch>
+          </p:blipFill>
+          <p:spPr>
+            <a:xfrm>
+              <a:off x="11502293" y="21039140"/>
+              <a:ext cx="579982" cy="552413"/>
+            </a:xfrm>
+            <a:prstGeom prst="rect">
+              <a:avLst/>
+            </a:prstGeom>
+          </p:spPr>
+        </p:pic>
+      </p:grpSp>
+      <p:grpSp>
+        <p:nvGrpSpPr>
+          <p:cNvPr id="29" name="Gruppieren 28">
+            <a:extLst>
+              <a:ext uri="{FF2B5EF4-FFF2-40B4-BE49-F238E27FC236}">
+                <a16:creationId xmlns:a16="http://schemas.microsoft.com/office/drawing/2014/main" id="{B5D49D8E-1DD2-06DA-375B-CDD24A9DF9B4}"/>
+              </a:ext>
+            </a:extLst>
+          </p:cNvPr>
+          <p:cNvGrpSpPr/>
+          <p:nvPr/>
+        </p:nvGrpSpPr>
+        <p:grpSpPr>
+          <a:xfrm>
+            <a:off x="7240634" y="22816467"/>
+            <a:ext cx="10827110" cy="1323439"/>
+            <a:chOff x="7240634" y="22816467"/>
+            <a:chExt cx="10827110" cy="1323439"/>
+          </a:xfrm>
+        </p:grpSpPr>
+        <p:sp>
+          <p:nvSpPr>
+            <p:cNvPr id="121" name="Textfeld 120">
+              <a:extLst>
+                <a:ext uri="{FF2B5EF4-FFF2-40B4-BE49-F238E27FC236}">
+                  <a16:creationId xmlns:a16="http://schemas.microsoft.com/office/drawing/2014/main" id="{3D9194FF-EC98-62BE-2DAB-AD75C90ADBA1}"/>
+                </a:ext>
+              </a:extLst>
+            </p:cNvPr>
+            <p:cNvSpPr txBox="1"/>
+            <p:nvPr/>
+          </p:nvSpPr>
+          <p:spPr>
+            <a:xfrm>
+              <a:off x="7240634" y="22816467"/>
+              <a:ext cx="10827110" cy="1323439"/>
+            </a:xfrm>
+            <a:prstGeom prst="rect">
+              <a:avLst/>
+            </a:prstGeom>
+            <a:noFill/>
+          </p:spPr>
+          <p:txBody>
+            <a:bodyPr wrap="square">
+              <a:spAutoFit/>
+            </a:bodyPr>
+            <a:lstStyle/>
+            <a:p>
+              <a:r>
+                <a:rPr kumimoji="0" lang="de-DE" sz="4000" b="1" i="0" u="sng" strike="noStrike" kern="1200" cap="none" spc="0" normalizeH="0" baseline="0" noProof="0" dirty="0">
+                  <a:ln>
+                    <a:noFill/>
+                  </a:ln>
+                  <a:solidFill>
+                    <a:prstClr val="black"/>
+                  </a:solidFill>
+                  <a:effectLst/>
+                  <a:uLnTx/>
+                  <a:uFillTx/>
+                  <a:latin typeface="Calibri"/>
+                  <a:ea typeface="+mn-ea"/>
+                  <a:cs typeface="+mn-cs"/>
+                  <a:sym typeface="Wingdings" panose="05000000000000000000" pitchFamily="2" charset="2"/>
+                </a:rPr>
+                <a:t>Graph </a:t>
+              </a:r>
+              <a:r>
+                <a:rPr kumimoji="0" lang="de-DE" sz="4000" b="1" i="0" u="sng" strike="noStrike" kern="1200" cap="none" spc="0" normalizeH="0" baseline="0" noProof="0" dirty="0" err="1">
+                  <a:ln>
+                    <a:noFill/>
+                  </a:ln>
+                  <a:solidFill>
+                    <a:prstClr val="black"/>
+                  </a:solidFill>
+                  <a:effectLst/>
+                  <a:uLnTx/>
+                  <a:uFillTx/>
+                  <a:latin typeface="Calibri"/>
+                  <a:ea typeface="+mn-ea"/>
+                  <a:cs typeface="+mn-cs"/>
+                  <a:sym typeface="Wingdings" panose="05000000000000000000" pitchFamily="2" charset="2"/>
+                </a:rPr>
+                <a:t>Literacy</a:t>
+              </a:r>
+              <a:r>
+                <a:rPr kumimoji="0" lang="de-DE" sz="4000" b="1" i="0" u="sng" strike="noStrike" kern="1200" cap="none" spc="0" normalizeH="0" baseline="0" noProof="0" dirty="0">
+                  <a:ln>
+                    <a:noFill/>
+                  </a:ln>
+                  <a:solidFill>
+                    <a:prstClr val="black"/>
+                  </a:solidFill>
+                  <a:effectLst/>
+                  <a:uLnTx/>
+                  <a:uFillTx/>
+                  <a:latin typeface="Calibri"/>
+                  <a:ea typeface="+mn-ea"/>
+                  <a:cs typeface="+mn-cs"/>
+                  <a:sym typeface="Wingdings" panose="05000000000000000000" pitchFamily="2" charset="2"/>
+                </a:rPr>
+                <a:t> Level</a:t>
+              </a:r>
+              <a:r>
+                <a:rPr kumimoji="0" lang="de-DE" sz="4000" i="0" strike="noStrike" kern="1200" cap="none" spc="0" normalizeH="0" baseline="0" noProof="0" dirty="0">
+                  <a:ln>
+                    <a:noFill/>
+                  </a:ln>
+                  <a:solidFill>
+                    <a:prstClr val="black"/>
+                  </a:solidFill>
+                  <a:effectLst/>
+                  <a:uLnTx/>
+                  <a:uFillTx/>
+                  <a:latin typeface="Calibri"/>
+                  <a:ea typeface="+mn-ea"/>
+                  <a:cs typeface="+mn-cs"/>
+                  <a:sym typeface="Wingdings" panose="05000000000000000000" pitchFamily="2" charset="2"/>
+                </a:rPr>
+                <a:t>: </a:t>
+              </a:r>
+              <a:r>
+                <a:rPr kumimoji="0" lang="de-DE" sz="4000" b="0" i="0" u="none" strike="noStrike" kern="1200" cap="none" spc="0" normalizeH="0" baseline="0" noProof="0" dirty="0">
+                  <a:ln>
+                    <a:noFill/>
+                  </a:ln>
+                  <a:solidFill>
+                    <a:prstClr val="black"/>
+                  </a:solidFill>
+                  <a:effectLst/>
+                  <a:uLnTx/>
+                  <a:uFillTx/>
+                  <a:latin typeface="Calibri"/>
+                  <a:ea typeface="+mn-ea"/>
+                  <a:cs typeface="+mn-cs"/>
+                  <a:sym typeface="Wingdings" panose="05000000000000000000" pitchFamily="2" charset="2"/>
+                </a:rPr>
+                <a:t>Reading </a:t>
+              </a:r>
+              <a:r>
+                <a:rPr kumimoji="0" lang="de-DE" sz="4000" b="0" i="0" u="none" strike="noStrike" kern="1200" cap="none" spc="0" normalizeH="0" baseline="0" noProof="0" dirty="0" err="1">
+                  <a:ln>
+                    <a:noFill/>
+                  </a:ln>
+                  <a:solidFill>
+                    <a:prstClr val="black"/>
+                  </a:solidFill>
+                  <a:effectLst/>
+                  <a:uLnTx/>
+                  <a:uFillTx/>
+                  <a:latin typeface="Calibri"/>
+                  <a:ea typeface="+mn-ea"/>
+                  <a:cs typeface="+mn-cs"/>
+                  <a:sym typeface="Wingdings" panose="05000000000000000000" pitchFamily="2" charset="2"/>
+                </a:rPr>
+                <a:t>the</a:t>
+              </a:r>
+              <a:r>
+                <a:rPr kumimoji="0" lang="de-DE" sz="4000" b="0" i="0" u="none" strike="noStrike" kern="1200" cap="none" spc="0" normalizeH="0" baseline="0" noProof="0" dirty="0">
+                  <a:ln>
+                    <a:noFill/>
+                  </a:ln>
+                  <a:solidFill>
+                    <a:prstClr val="black"/>
+                  </a:solidFill>
+                  <a:effectLst/>
+                  <a:uLnTx/>
+                  <a:uFillTx/>
+                  <a:latin typeface="Calibri"/>
+                  <a:ea typeface="+mn-ea"/>
+                  <a:cs typeface="+mn-cs"/>
+                  <a:sym typeface="Wingdings" panose="05000000000000000000" pitchFamily="2" charset="2"/>
+                </a:rPr>
+                <a:t> </a:t>
+              </a:r>
+              <a:r>
+                <a:rPr kumimoji="0" lang="de-DE" sz="4000" b="0" i="0" u="none" strike="noStrike" kern="1200" cap="none" spc="0" normalizeH="0" baseline="0" noProof="0" dirty="0" err="1">
+                  <a:ln>
+                    <a:noFill/>
+                  </a:ln>
+                  <a:solidFill>
+                    <a:prstClr val="black"/>
+                  </a:solidFill>
+                  <a:effectLst/>
+                  <a:uLnTx/>
+                  <a:uFillTx/>
+                  <a:latin typeface="Calibri"/>
+                  <a:ea typeface="+mn-ea"/>
+                  <a:cs typeface="+mn-cs"/>
+                  <a:sym typeface="Wingdings" panose="05000000000000000000" pitchFamily="2" charset="2"/>
+                </a:rPr>
+                <a:t>data</a:t>
+              </a:r>
+              <a:r>
+                <a:rPr kumimoji="0" lang="de-DE" sz="4000" b="0" i="0" u="none" strike="noStrike" kern="1200" cap="none" spc="0" normalizeH="0" baseline="0" noProof="0" dirty="0">
+                  <a:ln>
+                    <a:noFill/>
+                  </a:ln>
+                  <a:solidFill>
+                    <a:prstClr val="black"/>
+                  </a:solidFill>
+                  <a:effectLst/>
+                  <a:uLnTx/>
+                  <a:uFillTx/>
+                  <a:latin typeface="Calibri"/>
+                  <a:ea typeface="+mn-ea"/>
+                  <a:cs typeface="+mn-cs"/>
+                  <a:sym typeface="Wingdings" panose="05000000000000000000" pitchFamily="2" charset="2"/>
+                </a:rPr>
+                <a:t> </a:t>
+              </a:r>
+              <a:r>
+                <a:rPr lang="de-DE" sz="4000" dirty="0">
+                  <a:solidFill>
+                    <a:prstClr val="black"/>
+                  </a:solidFill>
+                  <a:latin typeface="Calibri"/>
+                  <a:sym typeface="Wingdings" panose="05000000000000000000" pitchFamily="2" charset="2"/>
+                </a:rPr>
+                <a:t>    </a:t>
+              </a:r>
+              <a:r>
+                <a:rPr kumimoji="0" lang="de-DE" sz="4000" b="0" i="0" u="none" strike="noStrike" kern="1200" cap="none" spc="0" normalizeH="0" baseline="0" noProof="0" dirty="0">
+                  <a:ln>
+                    <a:noFill/>
+                  </a:ln>
+                  <a:solidFill>
+                    <a:prstClr val="black"/>
+                  </a:solidFill>
+                  <a:effectLst/>
+                  <a:uLnTx/>
+                  <a:uFillTx/>
+                  <a:latin typeface="Calibri"/>
+                  <a:ea typeface="+mn-ea"/>
+                  <a:cs typeface="+mn-cs"/>
+                  <a:sym typeface="Wingdings" panose="05000000000000000000" pitchFamily="2" charset="2"/>
+                </a:rPr>
+                <a:t>, </a:t>
+              </a:r>
+              <a:r>
+                <a:rPr lang="de-DE" sz="4000" dirty="0">
+                  <a:solidFill>
+                    <a:prstClr val="black"/>
+                  </a:solidFill>
+                  <a:latin typeface="Calibri"/>
+                  <a:sym typeface="Wingdings" panose="05000000000000000000" pitchFamily="2" charset="2"/>
+                </a:rPr>
+                <a:t>R</a:t>
+              </a:r>
+              <a:r>
+                <a:rPr kumimoji="0" lang="de-DE" sz="4000" b="0" i="0" u="none" strike="noStrike" kern="1200" cap="none" spc="0" normalizeH="0" baseline="0" noProof="0" dirty="0" err="1">
+                  <a:ln>
+                    <a:noFill/>
+                  </a:ln>
+                  <a:solidFill>
+                    <a:prstClr val="black"/>
+                  </a:solidFill>
+                  <a:effectLst/>
+                  <a:uLnTx/>
+                  <a:uFillTx/>
+                  <a:latin typeface="Calibri"/>
+                  <a:ea typeface="+mn-ea"/>
+                  <a:cs typeface="+mn-cs"/>
+                  <a:sym typeface="Wingdings" panose="05000000000000000000" pitchFamily="2" charset="2"/>
+                </a:rPr>
+                <a:t>eading</a:t>
+              </a:r>
+              <a:r>
+                <a:rPr kumimoji="0" lang="de-DE" sz="4000" b="0" i="0" u="none" strike="noStrike" kern="1200" cap="none" spc="0" normalizeH="0" baseline="0" noProof="0" dirty="0">
+                  <a:ln>
+                    <a:noFill/>
+                  </a:ln>
+                  <a:solidFill>
+                    <a:prstClr val="black"/>
+                  </a:solidFill>
+                  <a:effectLst/>
+                  <a:uLnTx/>
+                  <a:uFillTx/>
+                  <a:latin typeface="Calibri"/>
+                  <a:ea typeface="+mn-ea"/>
+                  <a:cs typeface="+mn-cs"/>
+                  <a:sym typeface="Wingdings" panose="05000000000000000000" pitchFamily="2" charset="2"/>
+                </a:rPr>
+                <a:t> </a:t>
+              </a:r>
+              <a:r>
+                <a:rPr kumimoji="0" lang="de-DE" sz="4000" b="0" i="0" u="none" strike="noStrike" kern="1200" cap="none" spc="0" normalizeH="0" baseline="0" noProof="0" dirty="0" err="1">
+                  <a:ln>
+                    <a:noFill/>
+                  </a:ln>
+                  <a:solidFill>
+                    <a:prstClr val="black"/>
+                  </a:solidFill>
+                  <a:effectLst/>
+                  <a:uLnTx/>
+                  <a:uFillTx/>
+                  <a:latin typeface="Calibri"/>
+                  <a:ea typeface="+mn-ea"/>
+                  <a:cs typeface="+mn-cs"/>
+                  <a:sym typeface="Wingdings" panose="05000000000000000000" pitchFamily="2" charset="2"/>
+                </a:rPr>
+                <a:t>between</a:t>
+              </a:r>
+              <a:r>
+                <a:rPr kumimoji="0" lang="de-DE" sz="4000" b="0" i="0" u="none" strike="noStrike" kern="1200" cap="none" spc="0" normalizeH="0" baseline="0" noProof="0" dirty="0">
+                  <a:ln>
+                    <a:noFill/>
+                  </a:ln>
+                  <a:solidFill>
+                    <a:prstClr val="black"/>
+                  </a:solidFill>
+                  <a:effectLst/>
+                  <a:uLnTx/>
+                  <a:uFillTx/>
+                  <a:latin typeface="Calibri"/>
+                  <a:ea typeface="+mn-ea"/>
+                  <a:cs typeface="+mn-cs"/>
+                  <a:sym typeface="Wingdings" panose="05000000000000000000" pitchFamily="2" charset="2"/>
+                </a:rPr>
+                <a:t> </a:t>
+              </a:r>
+              <a:r>
+                <a:rPr kumimoji="0" lang="de-DE" sz="4000" b="0" i="0" u="none" strike="noStrike" kern="1200" cap="none" spc="0" normalizeH="0" baseline="0" noProof="0" dirty="0" err="1">
+                  <a:ln>
+                    <a:noFill/>
+                  </a:ln>
+                  <a:solidFill>
+                    <a:prstClr val="black"/>
+                  </a:solidFill>
+                  <a:effectLst/>
+                  <a:uLnTx/>
+                  <a:uFillTx/>
+                  <a:latin typeface="Calibri"/>
+                  <a:ea typeface="+mn-ea"/>
+                  <a:cs typeface="+mn-cs"/>
+                  <a:sym typeface="Wingdings" panose="05000000000000000000" pitchFamily="2" charset="2"/>
+                </a:rPr>
+                <a:t>the</a:t>
+              </a:r>
+              <a:r>
+                <a:rPr kumimoji="0" lang="de-DE" sz="4000" b="0" i="0" u="none" strike="noStrike" kern="1200" cap="none" spc="0" normalizeH="0" baseline="0" noProof="0" dirty="0">
+                  <a:ln>
+                    <a:noFill/>
+                  </a:ln>
+                  <a:solidFill>
+                    <a:prstClr val="black"/>
+                  </a:solidFill>
+                  <a:effectLst/>
+                  <a:uLnTx/>
+                  <a:uFillTx/>
+                  <a:latin typeface="Calibri"/>
+                  <a:ea typeface="+mn-ea"/>
+                  <a:cs typeface="+mn-cs"/>
+                  <a:sym typeface="Wingdings" panose="05000000000000000000" pitchFamily="2" charset="2"/>
+                </a:rPr>
+                <a:t> </a:t>
+              </a:r>
+              <a:r>
+                <a:rPr kumimoji="0" lang="de-DE" sz="4000" b="0" i="0" u="none" strike="noStrike" kern="1200" cap="none" spc="0" normalizeH="0" baseline="0" noProof="0" dirty="0" err="1">
+                  <a:ln>
+                    <a:noFill/>
+                  </a:ln>
+                  <a:solidFill>
+                    <a:prstClr val="black"/>
+                  </a:solidFill>
+                  <a:effectLst/>
+                  <a:uLnTx/>
+                  <a:uFillTx/>
+                  <a:latin typeface="Calibri"/>
+                  <a:ea typeface="+mn-ea"/>
+                  <a:cs typeface="+mn-cs"/>
+                  <a:sym typeface="Wingdings" panose="05000000000000000000" pitchFamily="2" charset="2"/>
+                </a:rPr>
+                <a:t>data</a:t>
+              </a:r>
+              <a:r>
+                <a:rPr kumimoji="0" lang="de-DE" sz="4000" b="0" i="0" u="none" strike="noStrike" kern="1200" cap="none" spc="0" normalizeH="0" baseline="0" noProof="0" dirty="0">
+                  <a:ln>
+                    <a:noFill/>
+                  </a:ln>
+                  <a:solidFill>
+                    <a:prstClr val="black"/>
+                  </a:solidFill>
+                  <a:effectLst/>
+                  <a:uLnTx/>
+                  <a:uFillTx/>
+                  <a:latin typeface="Calibri"/>
+                  <a:ea typeface="+mn-ea"/>
+                  <a:cs typeface="+mn-cs"/>
+                  <a:sym typeface="Wingdings" panose="05000000000000000000" pitchFamily="2" charset="2"/>
+                </a:rPr>
+                <a:t> </a:t>
+              </a:r>
+              <a:r>
+                <a:rPr lang="de-DE" sz="4000" dirty="0">
+                  <a:solidFill>
+                    <a:prstClr val="black"/>
+                  </a:solidFill>
+                  <a:latin typeface="Calibri"/>
+                  <a:sym typeface="Wingdings" panose="05000000000000000000" pitchFamily="2" charset="2"/>
+                </a:rPr>
+                <a:t>    </a:t>
+              </a:r>
+              <a:r>
+                <a:rPr kumimoji="0" lang="de-DE" sz="4000" b="0" i="0" u="none" strike="noStrike" kern="1200" cap="none" spc="0" normalizeH="0" baseline="0" noProof="0" dirty="0">
+                  <a:ln>
+                    <a:noFill/>
+                  </a:ln>
+                  <a:solidFill>
+                    <a:prstClr val="black"/>
+                  </a:solidFill>
+                  <a:effectLst/>
+                  <a:uLnTx/>
+                  <a:uFillTx/>
+                  <a:latin typeface="Calibri"/>
+                  <a:ea typeface="+mn-ea"/>
+                  <a:cs typeface="+mn-cs"/>
+                  <a:sym typeface="Wingdings" panose="05000000000000000000" pitchFamily="2" charset="2"/>
+                </a:rPr>
+                <a:t>, </a:t>
+              </a:r>
+              <a:r>
+                <a:rPr lang="de-DE" sz="4000" dirty="0">
+                  <a:solidFill>
+                    <a:prstClr val="black"/>
+                  </a:solidFill>
+                  <a:latin typeface="Calibri"/>
+                  <a:sym typeface="Wingdings" panose="05000000000000000000" pitchFamily="2" charset="2"/>
+                </a:rPr>
+                <a:t>R</a:t>
+              </a:r>
+              <a:r>
+                <a:rPr kumimoji="0" lang="de-DE" sz="4000" b="0" i="0" u="none" strike="noStrike" kern="1200" cap="none" spc="0" normalizeH="0" baseline="0" noProof="0" dirty="0" err="1">
+                  <a:ln>
+                    <a:noFill/>
+                  </a:ln>
+                  <a:solidFill>
+                    <a:prstClr val="black"/>
+                  </a:solidFill>
+                  <a:effectLst/>
+                  <a:uLnTx/>
+                  <a:uFillTx/>
+                  <a:latin typeface="Calibri"/>
+                  <a:ea typeface="+mn-ea"/>
+                  <a:cs typeface="+mn-cs"/>
+                  <a:sym typeface="Wingdings" panose="05000000000000000000" pitchFamily="2" charset="2"/>
+                </a:rPr>
+                <a:t>eading</a:t>
+              </a:r>
+              <a:r>
+                <a:rPr kumimoji="0" lang="de-DE" sz="4000" b="0" i="0" u="none" strike="noStrike" kern="1200" cap="none" spc="0" normalizeH="0" baseline="0" noProof="0" dirty="0">
+                  <a:ln>
+                    <a:noFill/>
+                  </a:ln>
+                  <a:solidFill>
+                    <a:prstClr val="black"/>
+                  </a:solidFill>
+                  <a:effectLst/>
+                  <a:uLnTx/>
+                  <a:uFillTx/>
+                  <a:latin typeface="Calibri"/>
+                  <a:ea typeface="+mn-ea"/>
+                  <a:cs typeface="+mn-cs"/>
+                  <a:sym typeface="Wingdings" panose="05000000000000000000" pitchFamily="2" charset="2"/>
+                </a:rPr>
+                <a:t> </a:t>
+              </a:r>
+              <a:r>
+                <a:rPr kumimoji="0" lang="de-DE" sz="4000" b="0" i="0" u="none" strike="noStrike" kern="1200" cap="none" spc="0" normalizeH="0" baseline="0" noProof="0" dirty="0" err="1">
+                  <a:ln>
+                    <a:noFill/>
+                  </a:ln>
+                  <a:solidFill>
+                    <a:prstClr val="black"/>
+                  </a:solidFill>
+                  <a:effectLst/>
+                  <a:uLnTx/>
+                  <a:uFillTx/>
+                  <a:latin typeface="Calibri"/>
+                  <a:ea typeface="+mn-ea"/>
+                  <a:cs typeface="+mn-cs"/>
+                  <a:sym typeface="Wingdings" panose="05000000000000000000" pitchFamily="2" charset="2"/>
+                </a:rPr>
+                <a:t>beyond</a:t>
+              </a:r>
+              <a:r>
+                <a:rPr kumimoji="0" lang="de-DE" sz="4000" b="0" i="0" u="none" strike="noStrike" kern="1200" cap="none" spc="0" normalizeH="0" baseline="0" noProof="0" dirty="0">
+                  <a:ln>
+                    <a:noFill/>
+                  </a:ln>
+                  <a:solidFill>
+                    <a:prstClr val="black"/>
+                  </a:solidFill>
+                  <a:effectLst/>
+                  <a:uLnTx/>
+                  <a:uFillTx/>
+                  <a:latin typeface="Calibri"/>
+                  <a:ea typeface="+mn-ea"/>
+                  <a:cs typeface="+mn-cs"/>
+                  <a:sym typeface="Wingdings" panose="05000000000000000000" pitchFamily="2" charset="2"/>
+                </a:rPr>
+                <a:t> </a:t>
+              </a:r>
+              <a:r>
+                <a:rPr kumimoji="0" lang="de-DE" sz="4000" b="0" i="0" u="none" strike="noStrike" kern="1200" cap="none" spc="0" normalizeH="0" baseline="0" noProof="0" dirty="0" err="1">
+                  <a:ln>
+                    <a:noFill/>
+                  </a:ln>
+                  <a:solidFill>
+                    <a:prstClr val="black"/>
+                  </a:solidFill>
+                  <a:effectLst/>
+                  <a:uLnTx/>
+                  <a:uFillTx/>
+                  <a:latin typeface="Calibri"/>
+                  <a:ea typeface="+mn-ea"/>
+                  <a:cs typeface="+mn-cs"/>
+                  <a:sym typeface="Wingdings" panose="05000000000000000000" pitchFamily="2" charset="2"/>
+                </a:rPr>
+                <a:t>the</a:t>
+              </a:r>
+              <a:r>
+                <a:rPr kumimoji="0" lang="de-DE" sz="4000" b="0" i="0" u="none" strike="noStrike" kern="1200" cap="none" spc="0" normalizeH="0" baseline="0" noProof="0" dirty="0">
+                  <a:ln>
+                    <a:noFill/>
+                  </a:ln>
+                  <a:solidFill>
+                    <a:prstClr val="black"/>
+                  </a:solidFill>
+                  <a:effectLst/>
+                  <a:uLnTx/>
+                  <a:uFillTx/>
+                  <a:latin typeface="Calibri"/>
+                  <a:ea typeface="+mn-ea"/>
+                  <a:cs typeface="+mn-cs"/>
+                  <a:sym typeface="Wingdings" panose="05000000000000000000" pitchFamily="2" charset="2"/>
+                </a:rPr>
+                <a:t> </a:t>
+              </a:r>
+              <a:r>
+                <a:rPr kumimoji="0" lang="de-DE" sz="4000" b="0" i="0" u="none" strike="noStrike" kern="1200" cap="none" spc="0" normalizeH="0" baseline="0" noProof="0" dirty="0" err="1">
+                  <a:ln>
+                    <a:noFill/>
+                  </a:ln>
+                  <a:solidFill>
+                    <a:prstClr val="black"/>
+                  </a:solidFill>
+                  <a:effectLst/>
+                  <a:uLnTx/>
+                  <a:uFillTx/>
+                  <a:latin typeface="Calibri"/>
+                  <a:ea typeface="+mn-ea"/>
+                  <a:cs typeface="+mn-cs"/>
+                  <a:sym typeface="Wingdings" panose="05000000000000000000" pitchFamily="2" charset="2"/>
+                </a:rPr>
+                <a:t>data</a:t>
+              </a:r>
+              <a:r>
+                <a:rPr kumimoji="0" lang="de-DE" sz="4000" b="0" i="0" u="none" strike="noStrike" kern="1200" cap="none" spc="0" normalizeH="0" baseline="0" noProof="0" dirty="0">
+                  <a:ln>
+                    <a:noFill/>
+                  </a:ln>
+                  <a:solidFill>
+                    <a:prstClr val="black"/>
+                  </a:solidFill>
+                  <a:effectLst/>
+                  <a:uLnTx/>
+                  <a:uFillTx/>
+                  <a:latin typeface="Calibri"/>
+                  <a:ea typeface="+mn-ea"/>
+                  <a:cs typeface="+mn-cs"/>
+                  <a:sym typeface="Wingdings" panose="05000000000000000000" pitchFamily="2" charset="2"/>
+                </a:rPr>
+                <a:t> </a:t>
+              </a:r>
+              <a:endParaRPr lang="de-DE" dirty="0"/>
+            </a:p>
+          </p:txBody>
+        </p:sp>
+        <p:pic>
+          <p:nvPicPr>
+            <p:cNvPr id="19" name="Grafik 18" descr="Marke 3 Silhouette">
+              <a:extLst>
+                <a:ext uri="{FF2B5EF4-FFF2-40B4-BE49-F238E27FC236}">
+                  <a16:creationId xmlns:a16="http://schemas.microsoft.com/office/drawing/2014/main" id="{954FBB1D-ADFF-B637-37F7-D55AAD51164E}"/>
+                </a:ext>
+              </a:extLst>
+            </p:cNvPr>
+            <p:cNvPicPr>
+              <a:picLocks noChangeAspect="1"/>
+            </p:cNvPicPr>
+            <p:nvPr/>
+          </p:nvPicPr>
+          <p:blipFill>
+            <a:blip r:embed="rId28">
+              <a:extLst>
+                <a:ext uri="{96DAC541-7B7A-43D3-8B79-37D633B846F1}">
+                  <asvg:svgBlip xmlns:asvg="http://schemas.microsoft.com/office/drawing/2016/SVG/main" r:embed="rId29"/>
+                </a:ext>
+              </a:extLst>
+            </a:blip>
+            <a:stretch>
+              <a:fillRect/>
+            </a:stretch>
+          </p:blipFill>
+          <p:spPr>
+            <a:xfrm>
+              <a:off x="16964756" y="23516450"/>
+              <a:ext cx="568439" cy="568439"/>
+            </a:xfrm>
+            <a:prstGeom prst="rect">
+              <a:avLst/>
+            </a:prstGeom>
+          </p:spPr>
+        </p:pic>
+        <p:pic>
+          <p:nvPicPr>
+            <p:cNvPr id="20" name="Grafik 19" descr="Marke 1 Silhouette">
+              <a:extLst>
+                <a:ext uri="{FF2B5EF4-FFF2-40B4-BE49-F238E27FC236}">
+                  <a16:creationId xmlns:a16="http://schemas.microsoft.com/office/drawing/2014/main" id="{7656B7F4-B048-17B8-39BA-F4AA3B4206EE}"/>
+                </a:ext>
+              </a:extLst>
+            </p:cNvPr>
+            <p:cNvPicPr>
+              <a:picLocks noChangeAspect="1"/>
+            </p:cNvPicPr>
+            <p:nvPr/>
+          </p:nvPicPr>
+          <p:blipFill>
+            <a:blip r:embed="rId30">
+              <a:extLst>
+                <a:ext uri="{96DAC541-7B7A-43D3-8B79-37D633B846F1}">
+                  <asvg:svgBlip xmlns:asvg="http://schemas.microsoft.com/office/drawing/2016/SVG/main" r:embed="rId31"/>
+                </a:ext>
+              </a:extLst>
+            </a:blip>
+            <a:stretch>
+              <a:fillRect/>
+            </a:stretch>
+          </p:blipFill>
+          <p:spPr>
+            <a:xfrm>
+              <a:off x="15365478" y="22909747"/>
+              <a:ext cx="568439" cy="568439"/>
+            </a:xfrm>
+            <a:prstGeom prst="rect">
+              <a:avLst/>
+            </a:prstGeom>
+          </p:spPr>
+        </p:pic>
+        <p:pic>
+          <p:nvPicPr>
+            <p:cNvPr id="21" name="Grafik 20" descr="Abzeichen Silhouette">
+              <a:extLst>
+                <a:ext uri="{FF2B5EF4-FFF2-40B4-BE49-F238E27FC236}">
+                  <a16:creationId xmlns:a16="http://schemas.microsoft.com/office/drawing/2014/main" id="{2A27F92C-726A-EBE9-2A82-B0484000BC9D}"/>
+                </a:ext>
+              </a:extLst>
+            </p:cNvPr>
+            <p:cNvPicPr>
+              <a:picLocks noChangeAspect="1"/>
+            </p:cNvPicPr>
+            <p:nvPr/>
+          </p:nvPicPr>
+          <p:blipFill>
+            <a:blip r:embed="rId32">
+              <a:extLst>
+                <a:ext uri="{96DAC541-7B7A-43D3-8B79-37D633B846F1}">
+                  <asvg:svgBlip xmlns:asvg="http://schemas.microsoft.com/office/drawing/2016/SVG/main" r:embed="rId33"/>
+                </a:ext>
+              </a:extLst>
+            </a:blip>
+            <a:stretch>
+              <a:fillRect/>
+            </a:stretch>
+          </p:blipFill>
+          <p:spPr>
+            <a:xfrm>
+              <a:off x="11035502" y="23533757"/>
+              <a:ext cx="568439" cy="568439"/>
+            </a:xfrm>
+            <a:prstGeom prst="rect">
+              <a:avLst/>
+            </a:prstGeom>
+          </p:spPr>
+        </p:pic>
+      </p:grpSp>
+      <p:pic>
+        <p:nvPicPr>
+          <p:cNvPr id="25" name="Grafik 24">
+            <a:extLst>
+              <a:ext uri="{FF2B5EF4-FFF2-40B4-BE49-F238E27FC236}">
+                <a16:creationId xmlns:a16="http://schemas.microsoft.com/office/drawing/2014/main" id="{5A1118A0-577C-626E-7543-06D91ECE200C}"/>
+              </a:ext>
+            </a:extLst>
+          </p:cNvPr>
+          <p:cNvPicPr>
+            <a:picLocks noChangeAspect="1"/>
+          </p:cNvPicPr>
+          <p:nvPr/>
+        </p:nvPicPr>
+        <p:blipFill>
+          <a:blip r:embed="rId41"/>
+          <a:stretch>
+            <a:fillRect/>
+          </a:stretch>
+        </p:blipFill>
+        <p:spPr>
+          <a:xfrm>
+            <a:off x="703551" y="31695310"/>
+            <a:ext cx="9174150" cy="10033400"/>
+          </a:xfrm>
+          <a:prstGeom prst="rect">
+            <a:avLst/>
+          </a:prstGeom>
+        </p:spPr>
+      </p:pic>
+      <p:pic>
+        <p:nvPicPr>
+          <p:cNvPr id="27" name="Grafik 26">
+            <a:extLst>
+              <a:ext uri="{FF2B5EF4-FFF2-40B4-BE49-F238E27FC236}">
+                <a16:creationId xmlns:a16="http://schemas.microsoft.com/office/drawing/2014/main" id="{51327357-6A63-0C41-39FA-E52076886562}"/>
+              </a:ext>
+            </a:extLst>
+          </p:cNvPr>
+          <p:cNvPicPr>
+            <a:picLocks noChangeAspect="1"/>
+          </p:cNvPicPr>
+          <p:nvPr/>
+        </p:nvPicPr>
+        <p:blipFill>
+          <a:blip r:embed="rId42">
+            <a:clrChange>
+              <a:clrFrom>
+                <a:srgbClr val="FFFFFF"/>
+              </a:clrFrom>
+              <a:clrTo>
+                <a:srgbClr val="FFFFFF">
+                  <a:alpha val="0"/>
+                </a:srgbClr>
+              </a:clrTo>
+            </a:clrChange>
+            <a:duotone>
+              <a:prstClr val="black"/>
+              <a:schemeClr val="accent3">
+                <a:tint val="45000"/>
+                <a:satMod val="400000"/>
+              </a:schemeClr>
+            </a:duotone>
+          </a:blip>
+          <a:stretch>
+            <a:fillRect/>
+          </a:stretch>
+        </p:blipFill>
+        <p:spPr>
+          <a:xfrm>
+            <a:off x="20824490" y="39451775"/>
+            <a:ext cx="3119906" cy="3148794"/>
+          </a:xfrm>
+          <a:prstGeom prst="rect">
+            <a:avLst/>
+          </a:prstGeom>
+          <a:noFill/>
+        </p:spPr>
+      </p:pic>
+      <p:sp>
+        <p:nvSpPr>
+          <p:cNvPr id="32" name="Textfeld 31">
+            <a:extLst>
+              <a:ext uri="{FF2B5EF4-FFF2-40B4-BE49-F238E27FC236}">
+                <a16:creationId xmlns:a16="http://schemas.microsoft.com/office/drawing/2014/main" id="{F5484666-A786-75D6-3E21-82056439A914}"/>
+              </a:ext>
+            </a:extLst>
+          </p:cNvPr>
+          <p:cNvSpPr txBox="1"/>
+          <p:nvPr/>
+        </p:nvSpPr>
+        <p:spPr>
+          <a:xfrm>
+            <a:off x="32288388" y="32366605"/>
+            <a:ext cx="5841076" cy="3885294"/>
+          </a:xfrm>
+          <a:prstGeom prst="rect">
+            <a:avLst/>
+          </a:prstGeom>
+          <a:noFill/>
+        </p:spPr>
+        <p:txBody>
+          <a:bodyPr wrap="square" rtlCol="0">
+            <a:spAutoFit/>
+          </a:bodyPr>
+          <a:lstStyle/>
+          <a:p>
+            <a:r>
+              <a:rPr lang="de-DE" dirty="0">
+                <a:solidFill>
+                  <a:srgbClr val="FF0000"/>
+                </a:solidFill>
+              </a:rPr>
+              <a:t>Hier noch Ergebnisse FF 3</a:t>
+            </a:r>
+          </a:p>
+        </p:txBody>
+      </p:sp>
+      <p:cxnSp>
+        <p:nvCxnSpPr>
+          <p:cNvPr id="34" name="Gerade Verbindung mit Pfeil 33">
+            <a:extLst>
+              <a:ext uri="{FF2B5EF4-FFF2-40B4-BE49-F238E27FC236}">
+                <a16:creationId xmlns:a16="http://schemas.microsoft.com/office/drawing/2014/main" id="{F5A27B53-8523-BE93-F161-0E39EE09B66D}"/>
+              </a:ext>
+            </a:extLst>
+          </p:cNvPr>
+          <p:cNvCxnSpPr>
+            <a:cxnSpLocks/>
+          </p:cNvCxnSpPr>
+          <p:nvPr/>
+        </p:nvCxnSpPr>
+        <p:spPr>
+          <a:xfrm flipH="1">
+            <a:off x="30453608" y="33651601"/>
+            <a:ext cx="1252346" cy="0"/>
+          </a:xfrm>
+          <a:prstGeom prst="straightConnector1">
+            <a:avLst/>
+          </a:prstGeom>
+          <a:ln>
+            <a:tailEnd type="triangle"/>
+          </a:ln>
+        </p:spPr>
+        <p:style>
+          <a:lnRef idx="3">
+            <a:schemeClr val="accent2"/>
+          </a:lnRef>
+          <a:fillRef idx="0">
+            <a:schemeClr val="accent2"/>
+          </a:fillRef>
+          <a:effectRef idx="2">
+            <a:schemeClr val="accent2"/>
+          </a:effectRef>
+          <a:fontRef idx="minor">
+            <a:schemeClr val="tx1"/>
+          </a:fontRef>
+        </p:style>
+      </p:cxnSp>
     </p:spTree>
     <p:extLst>
       <p:ext uri="{BB962C8B-B14F-4D97-AF65-F5344CB8AC3E}">

</xml_diff>